<commit_message>
created some flow diagrams for the presentation and updated the slides
</commit_message>
<xml_diff>
--- a/BestXYZ_Presentation.pptx
+++ b/BestXYZ_Presentation.pptx
@@ -8,17 +8,25 @@
     <p:sldMasterId id="2147483688" r:id="rId4"/>
   </p:sldMasterIdLst>
   <p:notesMasterIdLst>
-    <p:notesMasterId r:id="rId10"/>
+    <p:notesMasterId r:id="rId18"/>
   </p:notesMasterIdLst>
   <p:handoutMasterIdLst>
-    <p:handoutMasterId r:id="rId11"/>
+    <p:handoutMasterId r:id="rId19"/>
   </p:handoutMasterIdLst>
   <p:sldIdLst>
     <p:sldId id="640" r:id="rId5"/>
     <p:sldId id="670" r:id="rId6"/>
     <p:sldId id="671" r:id="rId7"/>
     <p:sldId id="673" r:id="rId8"/>
-    <p:sldId id="672" r:id="rId9"/>
+    <p:sldId id="674" r:id="rId9"/>
+    <p:sldId id="672" r:id="rId10"/>
+    <p:sldId id="676" r:id="rId11"/>
+    <p:sldId id="677" r:id="rId12"/>
+    <p:sldId id="678" r:id="rId13"/>
+    <p:sldId id="680" r:id="rId14"/>
+    <p:sldId id="681" r:id="rId15"/>
+    <p:sldId id="682" r:id="rId16"/>
+    <p:sldId id="679" r:id="rId17"/>
   </p:sldIdLst>
   <p:sldSz cx="9144000" cy="6858000" type="screen4x3"/>
   <p:notesSz cx="7010400" cy="9296400"/>
@@ -219,7 +227,7 @@
             <a:fld id="{7DCB7E7D-D78F-4F73-8947-477779E4DBFC}" type="datetimeFigureOut">
               <a:rPr lang="en-US" smtClean="0"/>
               <a:pPr/>
-              <a:t>7/30/2020</a:t>
+              <a:t>7/31/2020</a:t>
             </a:fld>
             <a:endParaRPr lang="en-US"/>
           </a:p>
@@ -387,7 +395,7 @@
             <a:fld id="{1F3F6506-BE8B-42C2-980F-F149B4D0456C}" type="datetimeFigureOut">
               <a:rPr lang="en-US" smtClean="0"/>
               <a:pPr/>
-              <a:t>7/30/2020</a:t>
+              <a:t>7/31/2020</a:t>
             </a:fld>
             <a:endParaRPr lang="en-US" dirty="0"/>
           </a:p>
@@ -899,7 +907,7 @@
             <a:fld id="{EDD3D1CD-4A61-4AF6-9065-40AF0A7B43C2}" type="datetimeFigureOut">
               <a:rPr lang="en-US" smtClean="0"/>
               <a:pPr/>
-              <a:t>7/30/2020</a:t>
+              <a:t>7/31/2020</a:t>
             </a:fld>
             <a:endParaRPr lang="en-US" dirty="0"/>
           </a:p>
@@ -1069,7 +1077,7 @@
             <a:fld id="{EDD3D1CD-4A61-4AF6-9065-40AF0A7B43C2}" type="datetimeFigureOut">
               <a:rPr lang="en-US" smtClean="0"/>
               <a:pPr/>
-              <a:t>7/30/2020</a:t>
+              <a:t>7/31/2020</a:t>
             </a:fld>
             <a:endParaRPr lang="en-US" dirty="0"/>
           </a:p>
@@ -1249,7 +1257,7 @@
             <a:fld id="{EDD3D1CD-4A61-4AF6-9065-40AF0A7B43C2}" type="datetimeFigureOut">
               <a:rPr lang="en-US" smtClean="0"/>
               <a:pPr/>
-              <a:t>7/30/2020</a:t>
+              <a:t>7/31/2020</a:t>
             </a:fld>
             <a:endParaRPr lang="en-US" dirty="0"/>
           </a:p>
@@ -1368,7 +1376,7 @@
             <a:fld id="{EDD3D1CD-4A61-4AF6-9065-40AF0A7B43C2}" type="datetimeFigureOut">
               <a:rPr lang="en-US" smtClean="0"/>
               <a:pPr/>
-              <a:t>7/30/2020</a:t>
+              <a:t>7/31/2020</a:t>
             </a:fld>
             <a:endParaRPr lang="en-US" dirty="0"/>
           </a:p>
@@ -1610,7 +1618,7 @@
             <a:fld id="{8AC46F5E-94A4-4AC5-9BC9-C80F6DA82346}" type="datetimeFigureOut">
               <a:rPr lang="en-US" smtClean="0"/>
               <a:pPr/>
-              <a:t>7/30/2020</a:t>
+              <a:t>7/31/2020</a:t>
             </a:fld>
             <a:endParaRPr lang="en-US" dirty="0"/>
           </a:p>
@@ -1780,7 +1788,7 @@
             <a:fld id="{8AC46F5E-94A4-4AC5-9BC9-C80F6DA82346}" type="datetimeFigureOut">
               <a:rPr lang="en-US" smtClean="0"/>
               <a:pPr/>
-              <a:t>7/30/2020</a:t>
+              <a:t>7/31/2020</a:t>
             </a:fld>
             <a:endParaRPr lang="en-US" dirty="0"/>
           </a:p>
@@ -2027,7 +2035,7 @@
             <a:fld id="{8AC46F5E-94A4-4AC5-9BC9-C80F6DA82346}" type="datetimeFigureOut">
               <a:rPr lang="en-US" smtClean="0"/>
               <a:pPr/>
-              <a:t>7/30/2020</a:t>
+              <a:t>7/31/2020</a:t>
             </a:fld>
             <a:endParaRPr lang="en-US" dirty="0"/>
           </a:p>
@@ -2314,7 +2322,7 @@
             <a:fld id="{8AC46F5E-94A4-4AC5-9BC9-C80F6DA82346}" type="datetimeFigureOut">
               <a:rPr lang="en-US" smtClean="0"/>
               <a:pPr/>
-              <a:t>7/30/2020</a:t>
+              <a:t>7/31/2020</a:t>
             </a:fld>
             <a:endParaRPr lang="en-US" dirty="0"/>
           </a:p>
@@ -2735,7 +2743,7 @@
               <a:pPr>
                 <a:defRPr/>
               </a:pPr>
-              <a:t>7/30/2020</a:t>
+              <a:t>7/31/2020</a:t>
             </a:fld>
             <a:endParaRPr lang="en-US" dirty="0">
               <a:solidFill>
@@ -2984,7 +2992,7 @@
               <a:pPr>
                 <a:defRPr/>
               </a:pPr>
-              <a:t>7/30/2020</a:t>
+              <a:t>7/31/2020</a:t>
             </a:fld>
             <a:endParaRPr lang="en-US" dirty="0"/>
           </a:p>
@@ -3242,7 +3250,7 @@
             <a:fld id="{3867CC50-2357-4E7F-AD0A-B816086AC7D9}" type="datetimeFigureOut">
               <a:rPr lang="en-US" smtClean="0"/>
               <a:pPr/>
-              <a:t>7/30/2020</a:t>
+              <a:t>7/31/2020</a:t>
             </a:fld>
             <a:endParaRPr lang="en-US" dirty="0"/>
           </a:p>
@@ -3412,7 +3420,7 @@
             <a:fld id="{EDD3D1CD-4A61-4AF6-9065-40AF0A7B43C2}" type="datetimeFigureOut">
               <a:rPr lang="en-US" smtClean="0"/>
               <a:pPr/>
-              <a:t>7/30/2020</a:t>
+              <a:t>7/31/2020</a:t>
             </a:fld>
             <a:endParaRPr lang="en-US" dirty="0"/>
           </a:p>
@@ -3582,7 +3590,7 @@
             <a:fld id="{3867CC50-2357-4E7F-AD0A-B816086AC7D9}" type="datetimeFigureOut">
               <a:rPr lang="en-US" smtClean="0"/>
               <a:pPr/>
-              <a:t>7/30/2020</a:t>
+              <a:t>7/31/2020</a:t>
             </a:fld>
             <a:endParaRPr lang="en-US" dirty="0"/>
           </a:p>
@@ -3829,7 +3837,7 @@
             <a:fld id="{3867CC50-2357-4E7F-AD0A-B816086AC7D9}" type="datetimeFigureOut">
               <a:rPr lang="en-US" smtClean="0"/>
               <a:pPr/>
-              <a:t>7/30/2020</a:t>
+              <a:t>7/31/2020</a:t>
             </a:fld>
             <a:endParaRPr lang="en-US" dirty="0"/>
           </a:p>
@@ -4116,7 +4124,7 @@
             <a:fld id="{3867CC50-2357-4E7F-AD0A-B816086AC7D9}" type="datetimeFigureOut">
               <a:rPr lang="en-US" smtClean="0"/>
               <a:pPr/>
-              <a:t>7/30/2020</a:t>
+              <a:t>7/31/2020</a:t>
             </a:fld>
             <a:endParaRPr lang="en-US" dirty="0"/>
           </a:p>
@@ -4537,7 +4545,7 @@
             <a:fld id="{3867CC50-2357-4E7F-AD0A-B816086AC7D9}" type="datetimeFigureOut">
               <a:rPr lang="en-US" smtClean="0"/>
               <a:pPr/>
-              <a:t>7/30/2020</a:t>
+              <a:t>7/31/2020</a:t>
             </a:fld>
             <a:endParaRPr lang="en-US" dirty="0"/>
           </a:p>
@@ -4656,7 +4664,7 @@
             <a:fld id="{3867CC50-2357-4E7F-AD0A-B816086AC7D9}" type="datetimeFigureOut">
               <a:rPr lang="en-US" smtClean="0"/>
               <a:pPr/>
-              <a:t>7/30/2020</a:t>
+              <a:t>7/31/2020</a:t>
             </a:fld>
             <a:endParaRPr lang="en-US" dirty="0"/>
           </a:p>
@@ -4753,7 +4761,7 @@
             <a:fld id="{3867CC50-2357-4E7F-AD0A-B816086AC7D9}" type="datetimeFigureOut">
               <a:rPr lang="en-US" smtClean="0"/>
               <a:pPr/>
-              <a:t>7/30/2020</a:t>
+              <a:t>7/31/2020</a:t>
             </a:fld>
             <a:endParaRPr lang="en-US" dirty="0"/>
           </a:p>
@@ -5030,7 +5038,7 @@
             <a:fld id="{3867CC50-2357-4E7F-AD0A-B816086AC7D9}" type="datetimeFigureOut">
               <a:rPr lang="en-US" smtClean="0"/>
               <a:pPr/>
-              <a:t>7/30/2020</a:t>
+              <a:t>7/31/2020</a:t>
             </a:fld>
             <a:endParaRPr lang="en-US" dirty="0"/>
           </a:p>
@@ -5284,7 +5292,7 @@
             <a:fld id="{3867CC50-2357-4E7F-AD0A-B816086AC7D9}" type="datetimeFigureOut">
               <a:rPr lang="en-US" smtClean="0"/>
               <a:pPr/>
-              <a:t>7/30/2020</a:t>
+              <a:t>7/31/2020</a:t>
             </a:fld>
             <a:endParaRPr lang="en-US" dirty="0"/>
           </a:p>
@@ -5454,7 +5462,7 @@
             <a:fld id="{3867CC50-2357-4E7F-AD0A-B816086AC7D9}" type="datetimeFigureOut">
               <a:rPr lang="en-US" smtClean="0"/>
               <a:pPr/>
-              <a:t>7/30/2020</a:t>
+              <a:t>7/31/2020</a:t>
             </a:fld>
             <a:endParaRPr lang="en-US" dirty="0"/>
           </a:p>
@@ -5634,7 +5642,7 @@
             <a:fld id="{3867CC50-2357-4E7F-AD0A-B816086AC7D9}" type="datetimeFigureOut">
               <a:rPr lang="en-US" smtClean="0"/>
               <a:pPr/>
-              <a:t>7/30/2020</a:t>
+              <a:t>7/31/2020</a:t>
             </a:fld>
             <a:endParaRPr lang="en-US" dirty="0"/>
           </a:p>
@@ -5881,7 +5889,7 @@
             <a:fld id="{EDD3D1CD-4A61-4AF6-9065-40AF0A7B43C2}" type="datetimeFigureOut">
               <a:rPr lang="en-US" smtClean="0"/>
               <a:pPr/>
-              <a:t>7/30/2020</a:t>
+              <a:t>7/31/2020</a:t>
             </a:fld>
             <a:endParaRPr lang="en-US" dirty="0"/>
           </a:p>
@@ -6168,7 +6176,7 @@
             <a:fld id="{EDD3D1CD-4A61-4AF6-9065-40AF0A7B43C2}" type="datetimeFigureOut">
               <a:rPr lang="en-US" smtClean="0"/>
               <a:pPr/>
-              <a:t>7/30/2020</a:t>
+              <a:t>7/31/2020</a:t>
             </a:fld>
             <a:endParaRPr lang="en-US" dirty="0"/>
           </a:p>
@@ -6589,7 +6597,7 @@
             <a:fld id="{EDD3D1CD-4A61-4AF6-9065-40AF0A7B43C2}" type="datetimeFigureOut">
               <a:rPr lang="en-US" smtClean="0"/>
               <a:pPr/>
-              <a:t>7/30/2020</a:t>
+              <a:t>7/31/2020</a:t>
             </a:fld>
             <a:endParaRPr lang="en-US" dirty="0"/>
           </a:p>
@@ -6708,7 +6716,7 @@
             <a:fld id="{EDD3D1CD-4A61-4AF6-9065-40AF0A7B43C2}" type="datetimeFigureOut">
               <a:rPr lang="en-US" smtClean="0"/>
               <a:pPr/>
-              <a:t>7/30/2020</a:t>
+              <a:t>7/31/2020</a:t>
             </a:fld>
             <a:endParaRPr lang="en-US" dirty="0"/>
           </a:p>
@@ -6805,7 +6813,7 @@
             <a:fld id="{EDD3D1CD-4A61-4AF6-9065-40AF0A7B43C2}" type="datetimeFigureOut">
               <a:rPr lang="en-US" smtClean="0"/>
               <a:pPr/>
-              <a:t>7/30/2020</a:t>
+              <a:t>7/31/2020</a:t>
             </a:fld>
             <a:endParaRPr lang="en-US" dirty="0"/>
           </a:p>
@@ -7082,7 +7090,7 @@
             <a:fld id="{EDD3D1CD-4A61-4AF6-9065-40AF0A7B43C2}" type="datetimeFigureOut">
               <a:rPr lang="en-US" smtClean="0"/>
               <a:pPr/>
-              <a:t>7/30/2020</a:t>
+              <a:t>7/31/2020</a:t>
             </a:fld>
             <a:endParaRPr lang="en-US" dirty="0"/>
           </a:p>
@@ -7336,7 +7344,7 @@
             <a:fld id="{EDD3D1CD-4A61-4AF6-9065-40AF0A7B43C2}" type="datetimeFigureOut">
               <a:rPr lang="en-US" smtClean="0"/>
               <a:pPr/>
-              <a:t>7/30/2020</a:t>
+              <a:t>7/31/2020</a:t>
             </a:fld>
             <a:endParaRPr lang="en-US" dirty="0"/>
           </a:p>
@@ -7549,7 +7557,7 @@
             <a:fld id="{EDD3D1CD-4A61-4AF6-9065-40AF0A7B43C2}" type="datetimeFigureOut">
               <a:rPr lang="en-US" smtClean="0"/>
               <a:pPr/>
-              <a:t>7/30/2020</a:t>
+              <a:t>7/31/2020</a:t>
             </a:fld>
             <a:endParaRPr lang="en-US" dirty="0"/>
           </a:p>
@@ -8060,7 +8068,7 @@
             <a:fld id="{8AC46F5E-94A4-4AC5-9BC9-C80F6DA82346}" type="datetimeFigureOut">
               <a:rPr lang="en-US" smtClean="0"/>
               <a:pPr/>
-              <a:t>7/30/2020</a:t>
+              <a:t>7/31/2020</a:t>
             </a:fld>
             <a:endParaRPr lang="en-US" dirty="0"/>
           </a:p>
@@ -9005,7 +9013,7 @@
                 </a:spcAft>
                 <a:defRPr/>
               </a:pPr>
-              <a:t>7/30/2020</a:t>
+              <a:t>7/31/2020</a:t>
             </a:fld>
             <a:endParaRPr lang="en-US" dirty="0">
               <a:solidFill>
@@ -9670,7 +9678,7 @@
             <a:fld id="{3867CC50-2357-4E7F-AD0A-B816086AC7D9}" type="datetimeFigureOut">
               <a:rPr lang="en-US" smtClean="0"/>
               <a:pPr/>
-              <a:t>7/30/2020</a:t>
+              <a:t>7/31/2020</a:t>
             </a:fld>
             <a:endParaRPr lang="en-US" dirty="0"/>
           </a:p>
@@ -10144,6 +10152,623 @@
 </p:sld>
 </file>
 
+<file path=ppt/slides/slide10.xml><?xml version="1.0" encoding="utf-8"?>
+<p:sld xmlns:a="http://schemas.openxmlformats.org/drawingml/2006/main" xmlns:r="http://schemas.openxmlformats.org/officeDocument/2006/relationships" xmlns:p="http://schemas.openxmlformats.org/presentationml/2006/main">
+  <p:cSld>
+    <p:spTree>
+      <p:nvGrpSpPr>
+        <p:cNvPr id="1" name=""/>
+        <p:cNvGrpSpPr/>
+        <p:nvPr/>
+      </p:nvGrpSpPr>
+      <p:grpSpPr>
+        <a:xfrm>
+          <a:off x="0" y="0"/>
+          <a:ext cx="0" cy="0"/>
+          <a:chOff x="0" y="0"/>
+          <a:chExt cx="0" cy="0"/>
+        </a:xfrm>
+      </p:grpSpPr>
+      <p:sp>
+        <p:nvSpPr>
+          <p:cNvPr id="2" name="Title 1"/>
+          <p:cNvSpPr>
+            <a:spLocks noGrp="1"/>
+          </p:cNvSpPr>
+          <p:nvPr>
+            <p:ph type="title"/>
+          </p:nvPr>
+        </p:nvSpPr>
+        <p:spPr/>
+        <p:txBody>
+          <a:bodyPr/>
+          <a:lstStyle/>
+          <a:p>
+            <a:r>
+              <a:rPr lang="en-US" dirty="0"/>
+              <a:t>Pre-Process Flow Diagram</a:t>
+            </a:r>
+          </a:p>
+        </p:txBody>
+      </p:sp>
+      <p:sp>
+        <p:nvSpPr>
+          <p:cNvPr id="4" name="Date Placeholder 3"/>
+          <p:cNvSpPr>
+            <a:spLocks noGrp="1"/>
+          </p:cNvSpPr>
+          <p:nvPr>
+            <p:ph type="dt" sz="half" idx="10"/>
+          </p:nvPr>
+        </p:nvSpPr>
+        <p:spPr/>
+        <p:txBody>
+          <a:bodyPr/>
+          <a:lstStyle/>
+          <a:p>
+            <a:pPr>
+              <a:defRPr/>
+            </a:pPr>
+            <a:fld id="{6D31C7B2-A2D2-47A3-B8FB-1F9F08ECB9D8}" type="datetime1">
+              <a:rPr lang="en-US" smtClean="0"/>
+              <a:pPr>
+                <a:defRPr/>
+              </a:pPr>
+              <a:t>7/31/2020</a:t>
+            </a:fld>
+            <a:endParaRPr lang="en-US" dirty="0"/>
+          </a:p>
+        </p:txBody>
+      </p:sp>
+      <p:sp>
+        <p:nvSpPr>
+          <p:cNvPr id="5" name="Slide Number Placeholder 4"/>
+          <p:cNvSpPr>
+            <a:spLocks noGrp="1"/>
+          </p:cNvSpPr>
+          <p:nvPr>
+            <p:ph type="sldNum" sz="quarter" idx="12"/>
+          </p:nvPr>
+        </p:nvSpPr>
+        <p:spPr/>
+        <p:txBody>
+          <a:bodyPr/>
+          <a:lstStyle/>
+          <a:p>
+            <a:pPr>
+              <a:defRPr/>
+            </a:pPr>
+            <a:fld id="{57CC77E1-4D69-4092-8C3D-CCF882968C30}" type="slidenum">
+              <a:rPr lang="en-US" smtClean="0"/>
+              <a:pPr>
+                <a:defRPr/>
+              </a:pPr>
+              <a:t>10</a:t>
+            </a:fld>
+            <a:endParaRPr lang="en-US" dirty="0"/>
+          </a:p>
+        </p:txBody>
+      </p:sp>
+      <p:pic>
+        <p:nvPicPr>
+          <p:cNvPr id="10" name="Content Placeholder 9" descr="A close up of text on a white background&#10;&#10;Description automatically generated">
+            <a:extLst>
+              <a:ext uri="{FF2B5EF4-FFF2-40B4-BE49-F238E27FC236}">
+                <a16:creationId xmlns:a16="http://schemas.microsoft.com/office/drawing/2014/main" id="{F1FED5EF-6D2F-4A0F-AA48-10B73C7F162D}"/>
+              </a:ext>
+            </a:extLst>
+          </p:cNvPr>
+          <p:cNvPicPr>
+            <a:picLocks noGrp="1"/>
+          </p:cNvPicPr>
+          <p:nvPr>
+            <p:ph idx="1"/>
+          </p:nvPr>
+        </p:nvPicPr>
+        <p:blipFill>
+          <a:blip r:embed="rId2">
+            <a:extLst>
+              <a:ext uri="{28A0092B-C50C-407E-A947-70E740481C1C}">
+                <a14:useLocalDpi xmlns:a14="http://schemas.microsoft.com/office/drawing/2010/main" val="0"/>
+              </a:ext>
+            </a:extLst>
+          </a:blip>
+          <a:stretch>
+            <a:fillRect/>
+          </a:stretch>
+        </p:blipFill>
+        <p:spPr>
+          <a:xfrm>
+            <a:off x="286512" y="1792224"/>
+            <a:ext cx="8723376" cy="3273552"/>
+          </a:xfrm>
+        </p:spPr>
+      </p:pic>
+    </p:spTree>
+    <p:extLst>
+      <p:ext uri="{BB962C8B-B14F-4D97-AF65-F5344CB8AC3E}">
+        <p14:creationId xmlns:p14="http://schemas.microsoft.com/office/powerpoint/2010/main" val="422479543"/>
+      </p:ext>
+    </p:extLst>
+  </p:cSld>
+  <p:clrMapOvr>
+    <a:masterClrMapping/>
+  </p:clrMapOvr>
+</p:sld>
+</file>
+
+<file path=ppt/slides/slide11.xml><?xml version="1.0" encoding="utf-8"?>
+<p:sld xmlns:a="http://schemas.openxmlformats.org/drawingml/2006/main" xmlns:r="http://schemas.openxmlformats.org/officeDocument/2006/relationships" xmlns:p="http://schemas.openxmlformats.org/presentationml/2006/main">
+  <p:cSld>
+    <p:spTree>
+      <p:nvGrpSpPr>
+        <p:cNvPr id="1" name=""/>
+        <p:cNvGrpSpPr/>
+        <p:nvPr/>
+      </p:nvGrpSpPr>
+      <p:grpSpPr>
+        <a:xfrm>
+          <a:off x="0" y="0"/>
+          <a:ext cx="0" cy="0"/>
+          <a:chOff x="0" y="0"/>
+          <a:chExt cx="0" cy="0"/>
+        </a:xfrm>
+      </p:grpSpPr>
+      <p:sp>
+        <p:nvSpPr>
+          <p:cNvPr id="2" name="Title 1"/>
+          <p:cNvSpPr>
+            <a:spLocks noGrp="1"/>
+          </p:cNvSpPr>
+          <p:nvPr>
+            <p:ph type="title"/>
+          </p:nvPr>
+        </p:nvSpPr>
+        <p:spPr/>
+        <p:txBody>
+          <a:bodyPr/>
+          <a:lstStyle/>
+          <a:p>
+            <a:r>
+              <a:rPr lang="en-US" dirty="0"/>
+              <a:t>Error Checking Flow Diagram</a:t>
+            </a:r>
+          </a:p>
+        </p:txBody>
+      </p:sp>
+      <p:sp>
+        <p:nvSpPr>
+          <p:cNvPr id="4" name="Date Placeholder 3"/>
+          <p:cNvSpPr>
+            <a:spLocks noGrp="1"/>
+          </p:cNvSpPr>
+          <p:nvPr>
+            <p:ph type="dt" sz="half" idx="10"/>
+          </p:nvPr>
+        </p:nvSpPr>
+        <p:spPr/>
+        <p:txBody>
+          <a:bodyPr/>
+          <a:lstStyle/>
+          <a:p>
+            <a:pPr>
+              <a:defRPr/>
+            </a:pPr>
+            <a:fld id="{6D31C7B2-A2D2-47A3-B8FB-1F9F08ECB9D8}" type="datetime1">
+              <a:rPr lang="en-US" smtClean="0"/>
+              <a:pPr>
+                <a:defRPr/>
+              </a:pPr>
+              <a:t>7/31/2020</a:t>
+            </a:fld>
+            <a:endParaRPr lang="en-US" dirty="0"/>
+          </a:p>
+        </p:txBody>
+      </p:sp>
+      <p:sp>
+        <p:nvSpPr>
+          <p:cNvPr id="5" name="Slide Number Placeholder 4"/>
+          <p:cNvSpPr>
+            <a:spLocks noGrp="1"/>
+          </p:cNvSpPr>
+          <p:nvPr>
+            <p:ph type="sldNum" sz="quarter" idx="12"/>
+          </p:nvPr>
+        </p:nvSpPr>
+        <p:spPr/>
+        <p:txBody>
+          <a:bodyPr/>
+          <a:lstStyle/>
+          <a:p>
+            <a:pPr>
+              <a:defRPr/>
+            </a:pPr>
+            <a:fld id="{57CC77E1-4D69-4092-8C3D-CCF882968C30}" type="slidenum">
+              <a:rPr lang="en-US" smtClean="0"/>
+              <a:pPr>
+                <a:defRPr/>
+              </a:pPr>
+              <a:t>11</a:t>
+            </a:fld>
+            <a:endParaRPr lang="en-US" dirty="0"/>
+          </a:p>
+        </p:txBody>
+      </p:sp>
+      <p:pic>
+        <p:nvPicPr>
+          <p:cNvPr id="7" name="Content Placeholder 6" descr="A close up of text on a white background&#10;&#10;Description automatically generated">
+            <a:extLst>
+              <a:ext uri="{FF2B5EF4-FFF2-40B4-BE49-F238E27FC236}">
+                <a16:creationId xmlns:a16="http://schemas.microsoft.com/office/drawing/2014/main" id="{96EC6458-D9D5-433F-9499-5B34EEE6C15A}"/>
+              </a:ext>
+            </a:extLst>
+          </p:cNvPr>
+          <p:cNvPicPr>
+            <a:picLocks noGrp="1" noChangeAspect="1"/>
+          </p:cNvPicPr>
+          <p:nvPr>
+            <p:ph idx="1"/>
+          </p:nvPr>
+        </p:nvPicPr>
+        <p:blipFill>
+          <a:blip r:embed="rId2">
+            <a:extLst>
+              <a:ext uri="{28A0092B-C50C-407E-A947-70E740481C1C}">
+                <a14:useLocalDpi xmlns:a14="http://schemas.microsoft.com/office/drawing/2010/main" val="0"/>
+              </a:ext>
+            </a:extLst>
+          </a:blip>
+          <a:stretch>
+            <a:fillRect/>
+          </a:stretch>
+        </p:blipFill>
+        <p:spPr>
+          <a:xfrm>
+            <a:off x="609600" y="1181924"/>
+            <a:ext cx="7924800" cy="4494151"/>
+          </a:xfrm>
+        </p:spPr>
+      </p:pic>
+    </p:spTree>
+    <p:extLst>
+      <p:ext uri="{BB962C8B-B14F-4D97-AF65-F5344CB8AC3E}">
+        <p14:creationId xmlns:p14="http://schemas.microsoft.com/office/powerpoint/2010/main" val="1347105821"/>
+      </p:ext>
+    </p:extLst>
+  </p:cSld>
+  <p:clrMapOvr>
+    <a:masterClrMapping/>
+  </p:clrMapOvr>
+</p:sld>
+</file>
+
+<file path=ppt/slides/slide12.xml><?xml version="1.0" encoding="utf-8"?>
+<p:sld xmlns:a="http://schemas.openxmlformats.org/drawingml/2006/main" xmlns:r="http://schemas.openxmlformats.org/officeDocument/2006/relationships" xmlns:p="http://schemas.openxmlformats.org/presentationml/2006/main">
+  <p:cSld>
+    <p:spTree>
+      <p:nvGrpSpPr>
+        <p:cNvPr id="1" name=""/>
+        <p:cNvGrpSpPr/>
+        <p:nvPr/>
+      </p:nvGrpSpPr>
+      <p:grpSpPr>
+        <a:xfrm>
+          <a:off x="0" y="0"/>
+          <a:ext cx="0" cy="0"/>
+          <a:chOff x="0" y="0"/>
+          <a:chExt cx="0" cy="0"/>
+        </a:xfrm>
+      </p:grpSpPr>
+      <p:sp>
+        <p:nvSpPr>
+          <p:cNvPr id="2" name="Title 1"/>
+          <p:cNvSpPr>
+            <a:spLocks noGrp="1"/>
+          </p:cNvSpPr>
+          <p:nvPr>
+            <p:ph type="title"/>
+          </p:nvPr>
+        </p:nvSpPr>
+        <p:spPr/>
+        <p:txBody>
+          <a:bodyPr/>
+          <a:lstStyle/>
+          <a:p>
+            <a:r>
+              <a:rPr lang="en-US" dirty="0"/>
+              <a:t>Message Parsing Flow Diagram</a:t>
+            </a:r>
+          </a:p>
+        </p:txBody>
+      </p:sp>
+      <p:sp>
+        <p:nvSpPr>
+          <p:cNvPr id="4" name="Date Placeholder 3"/>
+          <p:cNvSpPr>
+            <a:spLocks noGrp="1"/>
+          </p:cNvSpPr>
+          <p:nvPr>
+            <p:ph type="dt" sz="half" idx="10"/>
+          </p:nvPr>
+        </p:nvSpPr>
+        <p:spPr/>
+        <p:txBody>
+          <a:bodyPr/>
+          <a:lstStyle/>
+          <a:p>
+            <a:pPr>
+              <a:defRPr/>
+            </a:pPr>
+            <a:fld id="{6D31C7B2-A2D2-47A3-B8FB-1F9F08ECB9D8}" type="datetime1">
+              <a:rPr lang="en-US" smtClean="0"/>
+              <a:pPr>
+                <a:defRPr/>
+              </a:pPr>
+              <a:t>7/31/2020</a:t>
+            </a:fld>
+            <a:endParaRPr lang="en-US" dirty="0"/>
+          </a:p>
+        </p:txBody>
+      </p:sp>
+      <p:sp>
+        <p:nvSpPr>
+          <p:cNvPr id="5" name="Slide Number Placeholder 4"/>
+          <p:cNvSpPr>
+            <a:spLocks noGrp="1"/>
+          </p:cNvSpPr>
+          <p:nvPr>
+            <p:ph type="sldNum" sz="quarter" idx="12"/>
+          </p:nvPr>
+        </p:nvSpPr>
+        <p:spPr/>
+        <p:txBody>
+          <a:bodyPr/>
+          <a:lstStyle/>
+          <a:p>
+            <a:pPr>
+              <a:defRPr/>
+            </a:pPr>
+            <a:fld id="{57CC77E1-4D69-4092-8C3D-CCF882968C30}" type="slidenum">
+              <a:rPr lang="en-US" smtClean="0"/>
+              <a:pPr>
+                <a:defRPr/>
+              </a:pPr>
+              <a:t>12</a:t>
+            </a:fld>
+            <a:endParaRPr lang="en-US" dirty="0"/>
+          </a:p>
+        </p:txBody>
+      </p:sp>
+      <p:sp>
+        <p:nvSpPr>
+          <p:cNvPr id="3" name="Content Placeholder 2">
+            <a:extLst>
+              <a:ext uri="{FF2B5EF4-FFF2-40B4-BE49-F238E27FC236}">
+                <a16:creationId xmlns:a16="http://schemas.microsoft.com/office/drawing/2014/main" id="{AF58A9D9-89AC-401A-A63B-A43196E0D364}"/>
+              </a:ext>
+            </a:extLst>
+          </p:cNvPr>
+          <p:cNvSpPr>
+            <a:spLocks noGrp="1"/>
+          </p:cNvSpPr>
+          <p:nvPr>
+            <p:ph idx="1"/>
+          </p:nvPr>
+        </p:nvSpPr>
+        <p:spPr/>
+        <p:txBody>
+          <a:bodyPr/>
+          <a:lstStyle/>
+          <a:p>
+            <a:endParaRPr lang="en-US"/>
+          </a:p>
+        </p:txBody>
+      </p:sp>
+    </p:spTree>
+    <p:extLst>
+      <p:ext uri="{BB962C8B-B14F-4D97-AF65-F5344CB8AC3E}">
+        <p14:creationId xmlns:p14="http://schemas.microsoft.com/office/powerpoint/2010/main" val="3804191138"/>
+      </p:ext>
+    </p:extLst>
+  </p:cSld>
+  <p:clrMapOvr>
+    <a:masterClrMapping/>
+  </p:clrMapOvr>
+</p:sld>
+</file>
+
+<file path=ppt/slides/slide13.xml><?xml version="1.0" encoding="utf-8"?>
+<p:sld xmlns:a="http://schemas.openxmlformats.org/drawingml/2006/main" xmlns:r="http://schemas.openxmlformats.org/officeDocument/2006/relationships" xmlns:p="http://schemas.openxmlformats.org/presentationml/2006/main">
+  <p:cSld>
+    <p:spTree>
+      <p:nvGrpSpPr>
+        <p:cNvPr id="1" name=""/>
+        <p:cNvGrpSpPr/>
+        <p:nvPr/>
+      </p:nvGrpSpPr>
+      <p:grpSpPr>
+        <a:xfrm>
+          <a:off x="0" y="0"/>
+          <a:ext cx="0" cy="0"/>
+          <a:chOff x="0" y="0"/>
+          <a:chExt cx="0" cy="0"/>
+        </a:xfrm>
+      </p:grpSpPr>
+      <p:sp>
+        <p:nvSpPr>
+          <p:cNvPr id="2" name="Title 1"/>
+          <p:cNvSpPr>
+            <a:spLocks noGrp="1"/>
+          </p:cNvSpPr>
+          <p:nvPr>
+            <p:ph type="title"/>
+          </p:nvPr>
+        </p:nvSpPr>
+        <p:spPr/>
+        <p:txBody>
+          <a:bodyPr/>
+          <a:lstStyle/>
+          <a:p>
+            <a:r>
+              <a:rPr lang="en-US" dirty="0"/>
+              <a:t>Buffer Implementation</a:t>
+            </a:r>
+          </a:p>
+        </p:txBody>
+      </p:sp>
+      <p:sp>
+        <p:nvSpPr>
+          <p:cNvPr id="3" name="Content Placeholder 2"/>
+          <p:cNvSpPr>
+            <a:spLocks noGrp="1"/>
+          </p:cNvSpPr>
+          <p:nvPr>
+            <p:ph idx="1"/>
+          </p:nvPr>
+        </p:nvSpPr>
+        <p:spPr/>
+        <p:txBody>
+          <a:bodyPr/>
+          <a:lstStyle/>
+          <a:p>
+            <a:pPr lvl="1"/>
+            <a:endParaRPr lang="en-US" sz="2000" dirty="0"/>
+          </a:p>
+          <a:p>
+            <a:r>
+              <a:rPr lang="en-US" sz="2400" dirty="0"/>
+              <a:t>Ring Buffer Design</a:t>
+            </a:r>
+          </a:p>
+          <a:p>
+            <a:pPr lvl="1"/>
+            <a:r>
+              <a:rPr lang="en-US" sz="2000" dirty="0"/>
+              <a:t>Read Pointer</a:t>
+            </a:r>
+          </a:p>
+          <a:p>
+            <a:pPr lvl="1"/>
+            <a:r>
+              <a:rPr lang="en-US" sz="2000" dirty="0"/>
+              <a:t>Write Pointer</a:t>
+            </a:r>
+          </a:p>
+          <a:p>
+            <a:pPr lvl="1"/>
+            <a:r>
+              <a:rPr lang="en-US" sz="2000" dirty="0"/>
+              <a:t>Max Buffer size of 8192</a:t>
+            </a:r>
+          </a:p>
+          <a:p>
+            <a:r>
+              <a:rPr lang="en-US" sz="2400" dirty="0"/>
+              <a:t>How is a Ring Buffer different from a linear buffer?</a:t>
+            </a:r>
+          </a:p>
+          <a:p>
+            <a:pPr lvl="1"/>
+            <a:r>
+              <a:rPr lang="en-US" sz="2000" dirty="0"/>
+              <a:t>Wrap around</a:t>
+            </a:r>
+          </a:p>
+          <a:p>
+            <a:pPr lvl="1"/>
+            <a:r>
+              <a:rPr lang="en-US" sz="2000" dirty="0"/>
+              <a:t>Edge Case 1: Reading up to the write pointer</a:t>
+            </a:r>
+            <a:endParaRPr lang="en-US" sz="1600" dirty="0"/>
+          </a:p>
+          <a:p>
+            <a:pPr lvl="1"/>
+            <a:r>
+              <a:rPr lang="en-US" sz="2000" dirty="0"/>
+              <a:t>Edge Case 2: Writing up to the read pointer</a:t>
+            </a:r>
+          </a:p>
+          <a:p>
+            <a:pPr lvl="1"/>
+            <a:r>
+              <a:rPr lang="en-US" sz="2000" dirty="0"/>
+              <a:t>Edge Case 3: Wrapping around back to the beginning</a:t>
+            </a:r>
+          </a:p>
+        </p:txBody>
+      </p:sp>
+      <p:sp>
+        <p:nvSpPr>
+          <p:cNvPr id="4" name="Date Placeholder 3"/>
+          <p:cNvSpPr>
+            <a:spLocks noGrp="1"/>
+          </p:cNvSpPr>
+          <p:nvPr>
+            <p:ph type="dt" sz="half" idx="10"/>
+          </p:nvPr>
+        </p:nvSpPr>
+        <p:spPr/>
+        <p:txBody>
+          <a:bodyPr/>
+          <a:lstStyle/>
+          <a:p>
+            <a:pPr>
+              <a:defRPr/>
+            </a:pPr>
+            <a:fld id="{6D31C7B2-A2D2-47A3-B8FB-1F9F08ECB9D8}" type="datetime1">
+              <a:rPr lang="en-US" smtClean="0"/>
+              <a:pPr>
+                <a:defRPr/>
+              </a:pPr>
+              <a:t>7/31/2020</a:t>
+            </a:fld>
+            <a:endParaRPr lang="en-US" dirty="0"/>
+          </a:p>
+        </p:txBody>
+      </p:sp>
+      <p:sp>
+        <p:nvSpPr>
+          <p:cNvPr id="5" name="Slide Number Placeholder 4"/>
+          <p:cNvSpPr>
+            <a:spLocks noGrp="1"/>
+          </p:cNvSpPr>
+          <p:nvPr>
+            <p:ph type="sldNum" sz="quarter" idx="12"/>
+          </p:nvPr>
+        </p:nvSpPr>
+        <p:spPr/>
+        <p:txBody>
+          <a:bodyPr/>
+          <a:lstStyle/>
+          <a:p>
+            <a:pPr>
+              <a:defRPr/>
+            </a:pPr>
+            <a:fld id="{57CC77E1-4D69-4092-8C3D-CCF882968C30}" type="slidenum">
+              <a:rPr lang="en-US" smtClean="0"/>
+              <a:pPr>
+                <a:defRPr/>
+              </a:pPr>
+              <a:t>13</a:t>
+            </a:fld>
+            <a:endParaRPr lang="en-US" dirty="0"/>
+          </a:p>
+        </p:txBody>
+      </p:sp>
+    </p:spTree>
+    <p:extLst>
+      <p:ext uri="{BB962C8B-B14F-4D97-AF65-F5344CB8AC3E}">
+        <p14:creationId xmlns:p14="http://schemas.microsoft.com/office/powerpoint/2010/main" val="3109817593"/>
+      </p:ext>
+    </p:extLst>
+  </p:cSld>
+  <p:clrMapOvr>
+    <a:masterClrMapping/>
+  </p:clrMapOvr>
+</p:sld>
+</file>
+
 <file path=ppt/slides/slide2.xml><?xml version="1.0" encoding="utf-8"?>
 <p:sld xmlns:a="http://schemas.openxmlformats.org/drawingml/2006/main" xmlns:r="http://schemas.openxmlformats.org/officeDocument/2006/relationships" xmlns:p="http://schemas.openxmlformats.org/presentationml/2006/main">
   <p:cSld>
@@ -10299,7 +10924,7 @@
               <a:pPr>
                 <a:defRPr/>
               </a:pPr>
-              <a:t>7/30/2020</a:t>
+              <a:t>7/31/2020</a:t>
             </a:fld>
             <a:endParaRPr lang="en-US" dirty="0"/>
           </a:p>
@@ -10517,7 +11142,7 @@
               <a:pPr>
                 <a:defRPr/>
               </a:pPr>
-              <a:t>7/30/2020</a:t>
+              <a:t>7/31/2020</a:t>
             </a:fld>
             <a:endParaRPr lang="en-US" dirty="0"/>
           </a:p>
@@ -10775,7 +11400,7 @@
               <a:pPr>
                 <a:defRPr/>
               </a:pPr>
-              <a:t>7/30/2020</a:t>
+              <a:t>7/31/2020</a:t>
             </a:fld>
             <a:endParaRPr lang="en-US" dirty="0"/>
           </a:p>
@@ -10928,7 +11553,7 @@
           <a:p>
             <a:r>
               <a:rPr lang="en-US" dirty="0"/>
-              <a:t>Generating Output Files</a:t>
+              <a:t>Ready to Processing</a:t>
             </a:r>
           </a:p>
         </p:txBody>
@@ -10950,7 +11575,7 @@
           <a:p>
             <a:r>
               <a:rPr lang="en-US" sz="2400" dirty="0"/>
-              <a:t>Output files are generated based on input file paths</a:t>
+              <a:t>The user program is ready to process the input Novatel data file and GPS antenna positions.</a:t>
             </a:r>
           </a:p>
         </p:txBody>
@@ -10978,7 +11603,7 @@
               <a:pPr>
                 <a:defRPr/>
               </a:pPr>
-              <a:t>7/30/2020</a:t>
+              <a:t>7/31/2020</a:t>
             </a:fld>
             <a:endParaRPr lang="en-US" dirty="0"/>
           </a:p>
@@ -11008,6 +11633,179 @@
                 <a:defRPr/>
               </a:pPr>
               <a:t>5</a:t>
+            </a:fld>
+            <a:endParaRPr lang="en-US" dirty="0"/>
+          </a:p>
+        </p:txBody>
+      </p:sp>
+      <p:pic>
+        <p:nvPicPr>
+          <p:cNvPr id="8" name="Picture 7">
+            <a:extLst>
+              <a:ext uri="{FF2B5EF4-FFF2-40B4-BE49-F238E27FC236}">
+                <a16:creationId xmlns:a16="http://schemas.microsoft.com/office/drawing/2014/main" id="{6169E0CE-0609-44AD-8ED3-B82D5344EE38}"/>
+              </a:ext>
+            </a:extLst>
+          </p:cNvPr>
+          <p:cNvPicPr/>
+          <p:nvPr/>
+        </p:nvPicPr>
+        <p:blipFill rotWithShape="1">
+          <a:blip r:embed="rId2"/>
+          <a:srcRect b="41954"/>
+          <a:stretch/>
+        </p:blipFill>
+        <p:spPr bwMode="auto">
+          <a:xfrm>
+            <a:off x="1956949" y="1985962"/>
+            <a:ext cx="5400675" cy="4470401"/>
+          </a:xfrm>
+          <a:prstGeom prst="rect">
+            <a:avLst/>
+          </a:prstGeom>
+          <a:ln>
+            <a:noFill/>
+          </a:ln>
+          <a:extLst>
+            <a:ext uri="{53640926-AAD7-44D8-BBD7-CCE9431645EC}">
+              <a14:shadowObscured xmlns:a14="http://schemas.microsoft.com/office/drawing/2010/main"/>
+            </a:ext>
+          </a:extLst>
+        </p:spPr>
+      </p:pic>
+    </p:spTree>
+    <p:extLst>
+      <p:ext uri="{BB962C8B-B14F-4D97-AF65-F5344CB8AC3E}">
+        <p14:creationId xmlns:p14="http://schemas.microsoft.com/office/powerpoint/2010/main" val="2956342757"/>
+      </p:ext>
+    </p:extLst>
+  </p:cSld>
+  <p:clrMapOvr>
+    <a:masterClrMapping/>
+  </p:clrMapOvr>
+</p:sld>
+</file>
+
+<file path=ppt/slides/slide6.xml><?xml version="1.0" encoding="utf-8"?>
+<p:sld xmlns:a="http://schemas.openxmlformats.org/drawingml/2006/main" xmlns:r="http://schemas.openxmlformats.org/officeDocument/2006/relationships" xmlns:p="http://schemas.openxmlformats.org/presentationml/2006/main">
+  <p:cSld>
+    <p:spTree>
+      <p:nvGrpSpPr>
+        <p:cNvPr id="1" name=""/>
+        <p:cNvGrpSpPr/>
+        <p:nvPr/>
+      </p:nvGrpSpPr>
+      <p:grpSpPr>
+        <a:xfrm>
+          <a:off x="0" y="0"/>
+          <a:ext cx="0" cy="0"/>
+          <a:chOff x="0" y="0"/>
+          <a:chExt cx="0" cy="0"/>
+        </a:xfrm>
+      </p:grpSpPr>
+      <p:sp>
+        <p:nvSpPr>
+          <p:cNvPr id="2" name="Title 1"/>
+          <p:cNvSpPr>
+            <a:spLocks noGrp="1"/>
+          </p:cNvSpPr>
+          <p:nvPr>
+            <p:ph type="title"/>
+          </p:nvPr>
+        </p:nvSpPr>
+        <p:spPr/>
+        <p:txBody>
+          <a:bodyPr/>
+          <a:lstStyle/>
+          <a:p>
+            <a:r>
+              <a:rPr lang="en-US" dirty="0"/>
+              <a:t>During Processing</a:t>
+            </a:r>
+          </a:p>
+        </p:txBody>
+      </p:sp>
+      <p:sp>
+        <p:nvSpPr>
+          <p:cNvPr id="3" name="Content Placeholder 2"/>
+          <p:cNvSpPr>
+            <a:spLocks noGrp="1"/>
+          </p:cNvSpPr>
+          <p:nvPr>
+            <p:ph idx="1"/>
+          </p:nvPr>
+        </p:nvSpPr>
+        <p:spPr/>
+        <p:txBody>
+          <a:bodyPr/>
+          <a:lstStyle/>
+          <a:p>
+            <a:r>
+              <a:rPr lang="en-US" sz="2400" dirty="0"/>
+              <a:t>Output files are generated</a:t>
+            </a:r>
+          </a:p>
+          <a:p>
+            <a:r>
+              <a:rPr lang="en-US" sz="2400" dirty="0"/>
+              <a:t>GUI elements are disabled</a:t>
+            </a:r>
+          </a:p>
+        </p:txBody>
+      </p:sp>
+      <p:sp>
+        <p:nvSpPr>
+          <p:cNvPr id="4" name="Date Placeholder 3"/>
+          <p:cNvSpPr>
+            <a:spLocks noGrp="1"/>
+          </p:cNvSpPr>
+          <p:nvPr>
+            <p:ph type="dt" sz="half" idx="10"/>
+          </p:nvPr>
+        </p:nvSpPr>
+        <p:spPr/>
+        <p:txBody>
+          <a:bodyPr/>
+          <a:lstStyle/>
+          <a:p>
+            <a:pPr>
+              <a:defRPr/>
+            </a:pPr>
+            <a:fld id="{6D31C7B2-A2D2-47A3-B8FB-1F9F08ECB9D8}" type="datetime1">
+              <a:rPr lang="en-US" smtClean="0"/>
+              <a:pPr>
+                <a:defRPr/>
+              </a:pPr>
+              <a:t>7/31/2020</a:t>
+            </a:fld>
+            <a:endParaRPr lang="en-US" dirty="0"/>
+          </a:p>
+        </p:txBody>
+      </p:sp>
+      <p:sp>
+        <p:nvSpPr>
+          <p:cNvPr id="5" name="Slide Number Placeholder 4"/>
+          <p:cNvSpPr>
+            <a:spLocks noGrp="1"/>
+          </p:cNvSpPr>
+          <p:nvPr>
+            <p:ph type="sldNum" sz="quarter" idx="12"/>
+          </p:nvPr>
+        </p:nvSpPr>
+        <p:spPr/>
+        <p:txBody>
+          <a:bodyPr/>
+          <a:lstStyle/>
+          <a:p>
+            <a:pPr>
+              <a:defRPr/>
+            </a:pPr>
+            <a:fld id="{57CC77E1-4D69-4092-8C3D-CCF882968C30}" type="slidenum">
+              <a:rPr lang="en-US" smtClean="0"/>
+              <a:pPr>
+                <a:defRPr/>
+              </a:pPr>
+              <a:t>6</a:t>
             </a:fld>
             <a:endParaRPr lang="en-US" dirty="0"/>
           </a:p>
@@ -11032,7 +11830,7 @@
         </p:blipFill>
         <p:spPr>
           <a:xfrm>
-            <a:off x="2176462" y="1600200"/>
+            <a:off x="2176462" y="1921669"/>
             <a:ext cx="4791075" cy="4704556"/>
           </a:xfrm>
           <a:prstGeom prst="rect">
@@ -11044,6 +11842,665 @@
     <p:extLst>
       <p:ext uri="{BB962C8B-B14F-4D97-AF65-F5344CB8AC3E}">
         <p14:creationId xmlns:p14="http://schemas.microsoft.com/office/powerpoint/2010/main" val="2564832651"/>
+      </p:ext>
+    </p:extLst>
+  </p:cSld>
+  <p:clrMapOvr>
+    <a:masterClrMapping/>
+  </p:clrMapOvr>
+</p:sld>
+</file>
+
+<file path=ppt/slides/slide7.xml><?xml version="1.0" encoding="utf-8"?>
+<p:sld xmlns:a="http://schemas.openxmlformats.org/drawingml/2006/main" xmlns:r="http://schemas.openxmlformats.org/officeDocument/2006/relationships" xmlns:p="http://schemas.openxmlformats.org/presentationml/2006/main">
+  <p:cSld>
+    <p:spTree>
+      <p:nvGrpSpPr>
+        <p:cNvPr id="1" name=""/>
+        <p:cNvGrpSpPr/>
+        <p:nvPr/>
+      </p:nvGrpSpPr>
+      <p:grpSpPr>
+        <a:xfrm>
+          <a:off x="0" y="0"/>
+          <a:ext cx="0" cy="0"/>
+          <a:chOff x="0" y="0"/>
+          <a:chExt cx="0" cy="0"/>
+        </a:xfrm>
+      </p:grpSpPr>
+      <p:sp>
+        <p:nvSpPr>
+          <p:cNvPr id="2" name="Title 1"/>
+          <p:cNvSpPr>
+            <a:spLocks noGrp="1"/>
+          </p:cNvSpPr>
+          <p:nvPr>
+            <p:ph type="title"/>
+          </p:nvPr>
+        </p:nvSpPr>
+        <p:spPr/>
+        <p:txBody>
+          <a:bodyPr/>
+          <a:lstStyle/>
+          <a:p>
+            <a:r>
+              <a:rPr lang="en-US" dirty="0"/>
+              <a:t>Post Processing</a:t>
+            </a:r>
+          </a:p>
+        </p:txBody>
+      </p:sp>
+      <p:sp>
+        <p:nvSpPr>
+          <p:cNvPr id="3" name="Content Placeholder 2"/>
+          <p:cNvSpPr>
+            <a:spLocks noGrp="1"/>
+          </p:cNvSpPr>
+          <p:nvPr>
+            <p:ph idx="1"/>
+          </p:nvPr>
+        </p:nvSpPr>
+        <p:spPr/>
+        <p:txBody>
+          <a:bodyPr/>
+          <a:lstStyle/>
+          <a:p>
+            <a:r>
+              <a:rPr lang="en-US" sz="2400" dirty="0"/>
+              <a:t>GUI elements are re-enabled</a:t>
+            </a:r>
+          </a:p>
+          <a:p>
+            <a:r>
+              <a:rPr lang="en-US" sz="2400" dirty="0"/>
+              <a:t>Processing information is updated</a:t>
+            </a:r>
+          </a:p>
+        </p:txBody>
+      </p:sp>
+      <p:sp>
+        <p:nvSpPr>
+          <p:cNvPr id="4" name="Date Placeholder 3"/>
+          <p:cNvSpPr>
+            <a:spLocks noGrp="1"/>
+          </p:cNvSpPr>
+          <p:nvPr>
+            <p:ph type="dt" sz="half" idx="10"/>
+          </p:nvPr>
+        </p:nvSpPr>
+        <p:spPr/>
+        <p:txBody>
+          <a:bodyPr/>
+          <a:lstStyle/>
+          <a:p>
+            <a:pPr>
+              <a:defRPr/>
+            </a:pPr>
+            <a:fld id="{6D31C7B2-A2D2-47A3-B8FB-1F9F08ECB9D8}" type="datetime1">
+              <a:rPr lang="en-US" smtClean="0"/>
+              <a:pPr>
+                <a:defRPr/>
+              </a:pPr>
+              <a:t>7/31/2020</a:t>
+            </a:fld>
+            <a:endParaRPr lang="en-US" dirty="0"/>
+          </a:p>
+        </p:txBody>
+      </p:sp>
+      <p:sp>
+        <p:nvSpPr>
+          <p:cNvPr id="5" name="Slide Number Placeholder 4"/>
+          <p:cNvSpPr>
+            <a:spLocks noGrp="1"/>
+          </p:cNvSpPr>
+          <p:nvPr>
+            <p:ph type="sldNum" sz="quarter" idx="12"/>
+          </p:nvPr>
+        </p:nvSpPr>
+        <p:spPr/>
+        <p:txBody>
+          <a:bodyPr/>
+          <a:lstStyle/>
+          <a:p>
+            <a:pPr>
+              <a:defRPr/>
+            </a:pPr>
+            <a:fld id="{57CC77E1-4D69-4092-8C3D-CCF882968C30}" type="slidenum">
+              <a:rPr lang="en-US" smtClean="0"/>
+              <a:pPr>
+                <a:defRPr/>
+              </a:pPr>
+              <a:t>7</a:t>
+            </a:fld>
+            <a:endParaRPr lang="en-US" dirty="0"/>
+          </a:p>
+        </p:txBody>
+      </p:sp>
+      <p:pic>
+        <p:nvPicPr>
+          <p:cNvPr id="7" name="Picture 6">
+            <a:extLst>
+              <a:ext uri="{FF2B5EF4-FFF2-40B4-BE49-F238E27FC236}">
+                <a16:creationId xmlns:a16="http://schemas.microsoft.com/office/drawing/2014/main" id="{E0F8EACF-87B9-40ED-BC00-004B8DE45828}"/>
+              </a:ext>
+            </a:extLst>
+          </p:cNvPr>
+          <p:cNvPicPr/>
+          <p:nvPr/>
+        </p:nvPicPr>
+        <p:blipFill rotWithShape="1">
+          <a:blip r:embed="rId2"/>
+          <a:srcRect b="50000"/>
+          <a:stretch/>
+        </p:blipFill>
+        <p:spPr>
+          <a:xfrm>
+            <a:off x="538162" y="2286000"/>
+            <a:ext cx="3657601" cy="3190875"/>
+          </a:xfrm>
+          <a:prstGeom prst="rect">
+            <a:avLst/>
+          </a:prstGeom>
+        </p:spPr>
+      </p:pic>
+      <p:pic>
+        <p:nvPicPr>
+          <p:cNvPr id="9" name="Picture 8">
+            <a:extLst>
+              <a:ext uri="{FF2B5EF4-FFF2-40B4-BE49-F238E27FC236}">
+                <a16:creationId xmlns:a16="http://schemas.microsoft.com/office/drawing/2014/main" id="{17213C10-0640-4021-B21F-72065BA8538B}"/>
+              </a:ext>
+            </a:extLst>
+          </p:cNvPr>
+          <p:cNvPicPr/>
+          <p:nvPr/>
+        </p:nvPicPr>
+        <p:blipFill rotWithShape="1">
+          <a:blip r:embed="rId2"/>
+          <a:srcRect t="58279" b="6447"/>
+          <a:stretch/>
+        </p:blipFill>
+        <p:spPr>
+          <a:xfrm>
+            <a:off x="4994274" y="2286000"/>
+            <a:ext cx="3657601" cy="3190874"/>
+          </a:xfrm>
+          <a:prstGeom prst="rect">
+            <a:avLst/>
+          </a:prstGeom>
+        </p:spPr>
+      </p:pic>
+    </p:spTree>
+    <p:extLst>
+      <p:ext uri="{BB962C8B-B14F-4D97-AF65-F5344CB8AC3E}">
+        <p14:creationId xmlns:p14="http://schemas.microsoft.com/office/powerpoint/2010/main" val="1148189456"/>
+      </p:ext>
+    </p:extLst>
+  </p:cSld>
+  <p:clrMapOvr>
+    <a:masterClrMapping/>
+  </p:clrMapOvr>
+</p:sld>
+</file>
+
+<file path=ppt/slides/slide8.xml><?xml version="1.0" encoding="utf-8"?>
+<p:sld xmlns:a="http://schemas.openxmlformats.org/drawingml/2006/main" xmlns:r="http://schemas.openxmlformats.org/officeDocument/2006/relationships" xmlns:p="http://schemas.openxmlformats.org/presentationml/2006/main">
+  <p:cSld>
+    <p:spTree>
+      <p:nvGrpSpPr>
+        <p:cNvPr id="1" name=""/>
+        <p:cNvGrpSpPr/>
+        <p:nvPr/>
+      </p:nvGrpSpPr>
+      <p:grpSpPr>
+        <a:xfrm>
+          <a:off x="0" y="0"/>
+          <a:ext cx="0" cy="0"/>
+          <a:chOff x="0" y="0"/>
+          <a:chExt cx="0" cy="0"/>
+        </a:xfrm>
+      </p:grpSpPr>
+      <p:sp>
+        <p:nvSpPr>
+          <p:cNvPr id="2" name="Title 1"/>
+          <p:cNvSpPr>
+            <a:spLocks noGrp="1"/>
+          </p:cNvSpPr>
+          <p:nvPr>
+            <p:ph type="title"/>
+          </p:nvPr>
+        </p:nvSpPr>
+        <p:spPr/>
+        <p:txBody>
+          <a:bodyPr/>
+          <a:lstStyle/>
+          <a:p>
+            <a:r>
+              <a:rPr lang="en-US" dirty="0"/>
+              <a:t>Post Processing(cont.)</a:t>
+            </a:r>
+          </a:p>
+        </p:txBody>
+      </p:sp>
+      <p:sp>
+        <p:nvSpPr>
+          <p:cNvPr id="3" name="Content Placeholder 2"/>
+          <p:cNvSpPr>
+            <a:spLocks noGrp="1"/>
+          </p:cNvSpPr>
+          <p:nvPr>
+            <p:ph idx="1"/>
+          </p:nvPr>
+        </p:nvSpPr>
+        <p:spPr/>
+        <p:txBody>
+          <a:bodyPr/>
+          <a:lstStyle/>
+          <a:p>
+            <a:r>
+              <a:rPr lang="en-US" sz="2400" dirty="0"/>
+              <a:t>The extracted and calculated information has been written into the output files.</a:t>
+            </a:r>
+          </a:p>
+          <a:p>
+            <a:pPr lvl="1"/>
+            <a:r>
+              <a:rPr lang="en-US" sz="2000" dirty="0"/>
+              <a:t>Output Data File</a:t>
+            </a:r>
+          </a:p>
+          <a:p>
+            <a:pPr marL="457200" lvl="1" indent="0">
+              <a:buNone/>
+            </a:pPr>
+            <a:endParaRPr lang="en-US" sz="2000" dirty="0"/>
+          </a:p>
+          <a:p>
+            <a:pPr marL="457200" lvl="1" indent="0">
+              <a:buNone/>
+            </a:pPr>
+            <a:endParaRPr lang="en-US" sz="2000" dirty="0"/>
+          </a:p>
+          <a:p>
+            <a:pPr marL="457200" lvl="1" indent="0">
+              <a:buNone/>
+            </a:pPr>
+            <a:endParaRPr lang="en-US" sz="2000" dirty="0"/>
+          </a:p>
+          <a:p>
+            <a:pPr marL="457200" lvl="1" indent="0">
+              <a:buNone/>
+            </a:pPr>
+            <a:endParaRPr lang="en-US" sz="2000" dirty="0"/>
+          </a:p>
+          <a:p>
+            <a:pPr marL="457200" lvl="1" indent="0">
+              <a:buNone/>
+            </a:pPr>
+            <a:endParaRPr lang="en-US" sz="2000" dirty="0"/>
+          </a:p>
+          <a:p>
+            <a:pPr lvl="1"/>
+            <a:endParaRPr lang="en-US" sz="2000" dirty="0"/>
+          </a:p>
+          <a:p>
+            <a:pPr lvl="1"/>
+            <a:r>
+              <a:rPr lang="en-US" sz="2000" dirty="0"/>
+              <a:t>Log File</a:t>
+            </a:r>
+          </a:p>
+        </p:txBody>
+      </p:sp>
+      <p:sp>
+        <p:nvSpPr>
+          <p:cNvPr id="4" name="Date Placeholder 3"/>
+          <p:cNvSpPr>
+            <a:spLocks noGrp="1"/>
+          </p:cNvSpPr>
+          <p:nvPr>
+            <p:ph type="dt" sz="half" idx="10"/>
+          </p:nvPr>
+        </p:nvSpPr>
+        <p:spPr/>
+        <p:txBody>
+          <a:bodyPr/>
+          <a:lstStyle/>
+          <a:p>
+            <a:pPr>
+              <a:defRPr/>
+            </a:pPr>
+            <a:fld id="{6D31C7B2-A2D2-47A3-B8FB-1F9F08ECB9D8}" type="datetime1">
+              <a:rPr lang="en-US" smtClean="0"/>
+              <a:pPr>
+                <a:defRPr/>
+              </a:pPr>
+              <a:t>7/31/2020</a:t>
+            </a:fld>
+            <a:endParaRPr lang="en-US" dirty="0"/>
+          </a:p>
+        </p:txBody>
+      </p:sp>
+      <p:sp>
+        <p:nvSpPr>
+          <p:cNvPr id="5" name="Slide Number Placeholder 4"/>
+          <p:cNvSpPr>
+            <a:spLocks noGrp="1"/>
+          </p:cNvSpPr>
+          <p:nvPr>
+            <p:ph type="sldNum" sz="quarter" idx="12"/>
+          </p:nvPr>
+        </p:nvSpPr>
+        <p:spPr/>
+        <p:txBody>
+          <a:bodyPr/>
+          <a:lstStyle/>
+          <a:p>
+            <a:pPr>
+              <a:defRPr/>
+            </a:pPr>
+            <a:fld id="{57CC77E1-4D69-4092-8C3D-CCF882968C30}" type="slidenum">
+              <a:rPr lang="en-US" smtClean="0"/>
+              <a:pPr>
+                <a:defRPr/>
+              </a:pPr>
+              <a:t>8</a:t>
+            </a:fld>
+            <a:endParaRPr lang="en-US" dirty="0"/>
+          </a:p>
+        </p:txBody>
+      </p:sp>
+      <p:pic>
+        <p:nvPicPr>
+          <p:cNvPr id="8" name="Picture 7">
+            <a:extLst>
+              <a:ext uri="{FF2B5EF4-FFF2-40B4-BE49-F238E27FC236}">
+                <a16:creationId xmlns:a16="http://schemas.microsoft.com/office/drawing/2014/main" id="{DE158DB2-CB3C-4352-9399-C9EC86CCAD43}"/>
+              </a:ext>
+            </a:extLst>
+          </p:cNvPr>
+          <p:cNvPicPr/>
+          <p:nvPr/>
+        </p:nvPicPr>
+        <p:blipFill>
+          <a:blip r:embed="rId2"/>
+          <a:stretch>
+            <a:fillRect/>
+          </a:stretch>
+        </p:blipFill>
+        <p:spPr>
+          <a:xfrm>
+            <a:off x="3228644" y="4623594"/>
+            <a:ext cx="3381596" cy="1813719"/>
+          </a:xfrm>
+          <a:prstGeom prst="rect">
+            <a:avLst/>
+          </a:prstGeom>
+        </p:spPr>
+      </p:pic>
+      <p:pic>
+        <p:nvPicPr>
+          <p:cNvPr id="10" name="Picture 9">
+            <a:extLst>
+              <a:ext uri="{FF2B5EF4-FFF2-40B4-BE49-F238E27FC236}">
+                <a16:creationId xmlns:a16="http://schemas.microsoft.com/office/drawing/2014/main" id="{4C2F1665-1F8E-4CA3-8545-B7BD4C25F1C8}"/>
+              </a:ext>
+            </a:extLst>
+          </p:cNvPr>
+          <p:cNvPicPr/>
+          <p:nvPr/>
+        </p:nvPicPr>
+        <p:blipFill>
+          <a:blip r:embed="rId3"/>
+          <a:stretch>
+            <a:fillRect/>
+          </a:stretch>
+        </p:blipFill>
+        <p:spPr>
+          <a:xfrm>
+            <a:off x="1685485" y="2105688"/>
+            <a:ext cx="6467915" cy="1813719"/>
+          </a:xfrm>
+          <a:prstGeom prst="rect">
+            <a:avLst/>
+          </a:prstGeom>
+        </p:spPr>
+      </p:pic>
+    </p:spTree>
+    <p:extLst>
+      <p:ext uri="{BB962C8B-B14F-4D97-AF65-F5344CB8AC3E}">
+        <p14:creationId xmlns:p14="http://schemas.microsoft.com/office/powerpoint/2010/main" val="1663936987"/>
+      </p:ext>
+    </p:extLst>
+  </p:cSld>
+  <p:clrMapOvr>
+    <a:masterClrMapping/>
+  </p:clrMapOvr>
+</p:sld>
+</file>
+
+<file path=ppt/slides/slide9.xml><?xml version="1.0" encoding="utf-8"?>
+<p:sld xmlns:a="http://schemas.openxmlformats.org/drawingml/2006/main" xmlns:r="http://schemas.openxmlformats.org/officeDocument/2006/relationships" xmlns:p="http://schemas.openxmlformats.org/presentationml/2006/main">
+  <p:cSld>
+    <p:spTree>
+      <p:nvGrpSpPr>
+        <p:cNvPr id="1" name=""/>
+        <p:cNvGrpSpPr/>
+        <p:nvPr/>
+      </p:nvGrpSpPr>
+      <p:grpSpPr>
+        <a:xfrm>
+          <a:off x="0" y="0"/>
+          <a:ext cx="0" cy="0"/>
+          <a:chOff x="0" y="0"/>
+          <a:chExt cx="0" cy="0"/>
+        </a:xfrm>
+      </p:grpSpPr>
+      <p:sp>
+        <p:nvSpPr>
+          <p:cNvPr id="2" name="Title 1"/>
+          <p:cNvSpPr>
+            <a:spLocks noGrp="1"/>
+          </p:cNvSpPr>
+          <p:nvPr>
+            <p:ph type="title"/>
+          </p:nvPr>
+        </p:nvSpPr>
+        <p:spPr/>
+        <p:txBody>
+          <a:bodyPr/>
+          <a:lstStyle/>
+          <a:p>
+            <a:r>
+              <a:rPr lang="en-US" dirty="0"/>
+              <a:t>Software Languages &amp; Tools</a:t>
+            </a:r>
+          </a:p>
+        </p:txBody>
+      </p:sp>
+      <p:sp>
+        <p:nvSpPr>
+          <p:cNvPr id="3" name="Content Placeholder 2"/>
+          <p:cNvSpPr>
+            <a:spLocks noGrp="1"/>
+          </p:cNvSpPr>
+          <p:nvPr>
+            <p:ph idx="1"/>
+          </p:nvPr>
+        </p:nvSpPr>
+        <p:spPr/>
+        <p:txBody>
+          <a:bodyPr/>
+          <a:lstStyle/>
+          <a:p>
+            <a:r>
+              <a:rPr lang="en-US" sz="2400" dirty="0"/>
+              <a:t>Qt Creator</a:t>
+            </a:r>
+          </a:p>
+          <a:p>
+            <a:pPr lvl="1"/>
+            <a:r>
+              <a:rPr lang="en-US" sz="2000" dirty="0"/>
+              <a:t>GUI</a:t>
+            </a:r>
+          </a:p>
+          <a:p>
+            <a:pPr lvl="1"/>
+            <a:r>
+              <a:rPr lang="en-US" sz="2000" dirty="0"/>
+              <a:t>QThreads</a:t>
+            </a:r>
+          </a:p>
+          <a:p>
+            <a:r>
+              <a:rPr lang="en-US" sz="2400" dirty="0"/>
+              <a:t>C++</a:t>
+            </a:r>
+          </a:p>
+          <a:p>
+            <a:pPr lvl="1"/>
+            <a:r>
+              <a:rPr lang="en-US" sz="2000" dirty="0"/>
+              <a:t>File parsing</a:t>
+            </a:r>
+          </a:p>
+          <a:p>
+            <a:pPr lvl="1"/>
+            <a:r>
+              <a:rPr lang="en-US" sz="2000" dirty="0"/>
+              <a:t>Ring Buffer implementation and management</a:t>
+            </a:r>
+          </a:p>
+          <a:p>
+            <a:pPr lvl="1"/>
+            <a:r>
+              <a:rPr lang="en-US" sz="2000" dirty="0"/>
+              <a:t>Populating output files</a:t>
+            </a:r>
+          </a:p>
+          <a:p>
+            <a:r>
+              <a:rPr lang="en-US" sz="2400" dirty="0"/>
+              <a:t>GitHub</a:t>
+            </a:r>
+          </a:p>
+          <a:p>
+            <a:pPr lvl="1"/>
+            <a:r>
+              <a:rPr lang="en-US" sz="2000" dirty="0"/>
+              <a:t>Source control</a:t>
+            </a:r>
+          </a:p>
+          <a:p>
+            <a:r>
+              <a:rPr lang="en-US" sz="2400" dirty="0"/>
+              <a:t>Microsoft Office</a:t>
+            </a:r>
+          </a:p>
+          <a:p>
+            <a:pPr lvl="1"/>
+            <a:r>
+              <a:rPr lang="en-US" sz="2000" dirty="0"/>
+              <a:t>Word for RDITs and User Manual</a:t>
+            </a:r>
+          </a:p>
+          <a:p>
+            <a:pPr lvl="1"/>
+            <a:r>
+              <a:rPr lang="en-US" sz="2000" dirty="0"/>
+              <a:t>Excel for user story list</a:t>
+            </a:r>
+          </a:p>
+          <a:p>
+            <a:pPr lvl="1"/>
+            <a:r>
+              <a:rPr lang="en-US" sz="2000" dirty="0"/>
+              <a:t>PowerPoint for presentation</a:t>
+            </a:r>
+          </a:p>
+          <a:p>
+            <a:pPr lvl="1"/>
+            <a:endParaRPr lang="en-US" sz="2000" dirty="0"/>
+          </a:p>
+          <a:p>
+            <a:pPr lvl="1"/>
+            <a:endParaRPr lang="en-US" sz="2000" dirty="0"/>
+          </a:p>
+          <a:p>
+            <a:pPr marL="457200" lvl="1" indent="0">
+              <a:buNone/>
+            </a:pPr>
+            <a:endParaRPr lang="en-US" sz="2000" dirty="0"/>
+          </a:p>
+          <a:p>
+            <a:pPr lvl="1"/>
+            <a:endParaRPr lang="en-US" sz="2000" dirty="0"/>
+          </a:p>
+        </p:txBody>
+      </p:sp>
+      <p:sp>
+        <p:nvSpPr>
+          <p:cNvPr id="4" name="Date Placeholder 3"/>
+          <p:cNvSpPr>
+            <a:spLocks noGrp="1"/>
+          </p:cNvSpPr>
+          <p:nvPr>
+            <p:ph type="dt" sz="half" idx="10"/>
+          </p:nvPr>
+        </p:nvSpPr>
+        <p:spPr/>
+        <p:txBody>
+          <a:bodyPr/>
+          <a:lstStyle/>
+          <a:p>
+            <a:pPr>
+              <a:defRPr/>
+            </a:pPr>
+            <a:fld id="{6D31C7B2-A2D2-47A3-B8FB-1F9F08ECB9D8}" type="datetime1">
+              <a:rPr lang="en-US" smtClean="0"/>
+              <a:pPr>
+                <a:defRPr/>
+              </a:pPr>
+              <a:t>7/31/2020</a:t>
+            </a:fld>
+            <a:endParaRPr lang="en-US" dirty="0"/>
+          </a:p>
+        </p:txBody>
+      </p:sp>
+      <p:sp>
+        <p:nvSpPr>
+          <p:cNvPr id="5" name="Slide Number Placeholder 4"/>
+          <p:cNvSpPr>
+            <a:spLocks noGrp="1"/>
+          </p:cNvSpPr>
+          <p:nvPr>
+            <p:ph type="sldNum" sz="quarter" idx="12"/>
+          </p:nvPr>
+        </p:nvSpPr>
+        <p:spPr/>
+        <p:txBody>
+          <a:bodyPr/>
+          <a:lstStyle/>
+          <a:p>
+            <a:pPr>
+              <a:defRPr/>
+            </a:pPr>
+            <a:fld id="{57CC77E1-4D69-4092-8C3D-CCF882968C30}" type="slidenum">
+              <a:rPr lang="en-US" smtClean="0"/>
+              <a:pPr>
+                <a:defRPr/>
+              </a:pPr>
+              <a:t>9</a:t>
+            </a:fld>
+            <a:endParaRPr lang="en-US" dirty="0"/>
+          </a:p>
+        </p:txBody>
+      </p:sp>
+    </p:spTree>
+    <p:extLst>
+      <p:ext uri="{BB962C8B-B14F-4D97-AF65-F5344CB8AC3E}">
+        <p14:creationId xmlns:p14="http://schemas.microsoft.com/office/powerpoint/2010/main" val="3201197743"/>
       </p:ext>
     </p:extLst>
   </p:cSld>

</xml_diff>

<commit_message>
updated the slides with some notes
</commit_message>
<xml_diff>
--- a/BestXYZ_Presentation.pptx
+++ b/BestXYZ_Presentation.pptx
@@ -8,28 +8,29 @@
     <p:sldMasterId id="2147483688" r:id="rId4"/>
   </p:sldMasterIdLst>
   <p:notesMasterIdLst>
-    <p:notesMasterId r:id="rId21"/>
+    <p:notesMasterId r:id="rId22"/>
   </p:notesMasterIdLst>
   <p:handoutMasterIdLst>
-    <p:handoutMasterId r:id="rId22"/>
+    <p:handoutMasterId r:id="rId23"/>
   </p:handoutMasterIdLst>
   <p:sldIdLst>
     <p:sldId id="640" r:id="rId5"/>
     <p:sldId id="670" r:id="rId6"/>
     <p:sldId id="683" r:id="rId7"/>
     <p:sldId id="678" r:id="rId8"/>
-    <p:sldId id="671" r:id="rId9"/>
-    <p:sldId id="673" r:id="rId10"/>
-    <p:sldId id="674" r:id="rId11"/>
-    <p:sldId id="672" r:id="rId12"/>
-    <p:sldId id="676" r:id="rId13"/>
-    <p:sldId id="677" r:id="rId14"/>
-    <p:sldId id="680" r:id="rId15"/>
-    <p:sldId id="681" r:id="rId16"/>
-    <p:sldId id="679" r:id="rId17"/>
-    <p:sldId id="682" r:id="rId18"/>
-    <p:sldId id="684" r:id="rId19"/>
-    <p:sldId id="685" r:id="rId20"/>
+    <p:sldId id="686" r:id="rId9"/>
+    <p:sldId id="671" r:id="rId10"/>
+    <p:sldId id="673" r:id="rId11"/>
+    <p:sldId id="674" r:id="rId12"/>
+    <p:sldId id="672" r:id="rId13"/>
+    <p:sldId id="676" r:id="rId14"/>
+    <p:sldId id="677" r:id="rId15"/>
+    <p:sldId id="680" r:id="rId16"/>
+    <p:sldId id="681" r:id="rId17"/>
+    <p:sldId id="679" r:id="rId18"/>
+    <p:sldId id="682" r:id="rId19"/>
+    <p:sldId id="684" r:id="rId20"/>
+    <p:sldId id="685" r:id="rId21"/>
   </p:sldIdLst>
   <p:sldSz cx="9144000" cy="6858000" type="screen4x3"/>
   <p:notesSz cx="7010400" cy="9296400"/>
@@ -715,7 +716,7 @@
           <a:p>
             <a:r>
               <a:rPr lang="en-US" dirty="0"/>
-              <a:t>Hello. My name is Hannselthill Camacho and I am going to present the BestXYZ Processor Application</a:t>
+              <a:t>My name is Hannselthill Camacho and I am going to present the BestXYZ Processor Application</a:t>
             </a:r>
           </a:p>
         </p:txBody>
@@ -724,6 +725,680 @@
     <p:extLst>
       <p:ext uri="{BB962C8B-B14F-4D97-AF65-F5344CB8AC3E}">
         <p14:creationId xmlns:p14="http://schemas.microsoft.com/office/powerpoint/2010/main" val="1656051883"/>
+      </p:ext>
+    </p:extLst>
+  </p:cSld>
+  <p:clrMapOvr>
+    <a:masterClrMapping/>
+  </p:clrMapOvr>
+</p:notes>
+</file>
+
+<file path=ppt/notesSlides/notesSlide10.xml><?xml version="1.0" encoding="utf-8"?>
+<p:notes xmlns:a="http://schemas.openxmlformats.org/drawingml/2006/main" xmlns:r="http://schemas.openxmlformats.org/officeDocument/2006/relationships" xmlns:p="http://schemas.openxmlformats.org/presentationml/2006/main">
+  <p:cSld>
+    <p:spTree>
+      <p:nvGrpSpPr>
+        <p:cNvPr id="1" name=""/>
+        <p:cNvGrpSpPr/>
+        <p:nvPr/>
+      </p:nvGrpSpPr>
+      <p:grpSpPr>
+        <a:xfrm>
+          <a:off x="0" y="0"/>
+          <a:ext cx="0" cy="0"/>
+          <a:chOff x="0" y="0"/>
+          <a:chExt cx="0" cy="0"/>
+        </a:xfrm>
+      </p:grpSpPr>
+      <p:sp>
+        <p:nvSpPr>
+          <p:cNvPr id="2" name="Slide Image Placeholder 1"/>
+          <p:cNvSpPr>
+            <a:spLocks noGrp="1" noRot="1" noChangeAspect="1"/>
+          </p:cNvSpPr>
+          <p:nvPr>
+            <p:ph type="sldImg"/>
+          </p:nvPr>
+        </p:nvSpPr>
+        <p:spPr/>
+      </p:sp>
+      <p:sp>
+        <p:nvSpPr>
+          <p:cNvPr id="3" name="Notes Placeholder 2"/>
+          <p:cNvSpPr>
+            <a:spLocks noGrp="1"/>
+          </p:cNvSpPr>
+          <p:nvPr>
+            <p:ph type="body" idx="1"/>
+          </p:nvPr>
+        </p:nvSpPr>
+        <p:spPr/>
+        <p:txBody>
+          <a:bodyPr/>
+          <a:lstStyle/>
+          <a:p>
+            <a:r>
+              <a:rPr lang="en-US" dirty="0"/>
+              <a:t>Once it is done processing, An output data file is populated with the GPS time, positional differences, and the Root Sum Squared of the magnitude of those differences.</a:t>
+            </a:r>
+          </a:p>
+          <a:p>
+            <a:endParaRPr lang="en-US" dirty="0"/>
+          </a:p>
+          <a:p>
+            <a:r>
+              <a:rPr lang="en-US" dirty="0"/>
+              <a:t>A log file is generated with the Start and end times in UTC time as well as GPS time. The log also contains the number of records processed and the percentage of positional differences with a Root Sum Squared greater than half a meter.</a:t>
+            </a:r>
+          </a:p>
+          <a:p>
+            <a:endParaRPr lang="en-US" dirty="0"/>
+          </a:p>
+          <a:p>
+            <a:r>
+              <a:rPr lang="en-US" dirty="0"/>
+              <a:t>The GUI is also updated with some of the Log data for the most recent run.</a:t>
+            </a:r>
+          </a:p>
+        </p:txBody>
+      </p:sp>
+    </p:spTree>
+    <p:extLst>
+      <p:ext uri="{BB962C8B-B14F-4D97-AF65-F5344CB8AC3E}">
+        <p14:creationId xmlns:p14="http://schemas.microsoft.com/office/powerpoint/2010/main" val="3478855324"/>
+      </p:ext>
+    </p:extLst>
+  </p:cSld>
+  <p:clrMapOvr>
+    <a:masterClrMapping/>
+  </p:clrMapOvr>
+</p:notes>
+</file>
+
+<file path=ppt/notesSlides/notesSlide11.xml><?xml version="1.0" encoding="utf-8"?>
+<p:notes xmlns:a="http://schemas.openxmlformats.org/drawingml/2006/main" xmlns:r="http://schemas.openxmlformats.org/officeDocument/2006/relationships" xmlns:p="http://schemas.openxmlformats.org/presentationml/2006/main">
+  <p:cSld>
+    <p:spTree>
+      <p:nvGrpSpPr>
+        <p:cNvPr id="1" name=""/>
+        <p:cNvGrpSpPr/>
+        <p:nvPr/>
+      </p:nvGrpSpPr>
+      <p:grpSpPr>
+        <a:xfrm>
+          <a:off x="0" y="0"/>
+          <a:ext cx="0" cy="0"/>
+          <a:chOff x="0" y="0"/>
+          <a:chExt cx="0" cy="0"/>
+        </a:xfrm>
+      </p:grpSpPr>
+      <p:sp>
+        <p:nvSpPr>
+          <p:cNvPr id="2" name="Slide Image Placeholder 1"/>
+          <p:cNvSpPr>
+            <a:spLocks noGrp="1" noRot="1" noChangeAspect="1"/>
+          </p:cNvSpPr>
+          <p:nvPr>
+            <p:ph type="sldImg"/>
+          </p:nvPr>
+        </p:nvSpPr>
+        <p:spPr/>
+      </p:sp>
+      <p:sp>
+        <p:nvSpPr>
+          <p:cNvPr id="3" name="Notes Placeholder 2"/>
+          <p:cNvSpPr>
+            <a:spLocks noGrp="1"/>
+          </p:cNvSpPr>
+          <p:nvPr>
+            <p:ph type="body" idx="1"/>
+          </p:nvPr>
+        </p:nvSpPr>
+        <p:spPr/>
+        <p:txBody>
+          <a:bodyPr/>
+          <a:lstStyle/>
+          <a:p>
+            <a:r>
+              <a:rPr lang="en-US" dirty="0"/>
+              <a:t>Here is an example of the output data and the Log file for a successful run.</a:t>
+            </a:r>
+          </a:p>
+          <a:p>
+            <a:endParaRPr lang="en-US" dirty="0"/>
+          </a:p>
+          <a:p>
+            <a:r>
+              <a:rPr lang="en-US" dirty="0"/>
+              <a:t>[Talk about the truncated nature of the output data in the example] </a:t>
+            </a:r>
+          </a:p>
+        </p:txBody>
+      </p:sp>
+    </p:spTree>
+    <p:extLst>
+      <p:ext uri="{BB962C8B-B14F-4D97-AF65-F5344CB8AC3E}">
+        <p14:creationId xmlns:p14="http://schemas.microsoft.com/office/powerpoint/2010/main" val="2084178233"/>
+      </p:ext>
+    </p:extLst>
+  </p:cSld>
+  <p:clrMapOvr>
+    <a:masterClrMapping/>
+  </p:clrMapOvr>
+</p:notes>
+</file>
+
+<file path=ppt/notesSlides/notesSlide12.xml><?xml version="1.0" encoding="utf-8"?>
+<p:notes xmlns:a="http://schemas.openxmlformats.org/drawingml/2006/main" xmlns:r="http://schemas.openxmlformats.org/officeDocument/2006/relationships" xmlns:p="http://schemas.openxmlformats.org/presentationml/2006/main">
+  <p:cSld>
+    <p:spTree>
+      <p:nvGrpSpPr>
+        <p:cNvPr id="1" name=""/>
+        <p:cNvGrpSpPr/>
+        <p:nvPr/>
+      </p:nvGrpSpPr>
+      <p:grpSpPr>
+        <a:xfrm>
+          <a:off x="0" y="0"/>
+          <a:ext cx="0" cy="0"/>
+          <a:chOff x="0" y="0"/>
+          <a:chExt cx="0" cy="0"/>
+        </a:xfrm>
+      </p:grpSpPr>
+      <p:sp>
+        <p:nvSpPr>
+          <p:cNvPr id="2" name="Slide Image Placeholder 1"/>
+          <p:cNvSpPr>
+            <a:spLocks noGrp="1" noRot="1" noChangeAspect="1"/>
+          </p:cNvSpPr>
+          <p:nvPr>
+            <p:ph type="sldImg"/>
+          </p:nvPr>
+        </p:nvSpPr>
+        <p:spPr/>
+      </p:sp>
+      <p:sp>
+        <p:nvSpPr>
+          <p:cNvPr id="3" name="Notes Placeholder 2"/>
+          <p:cNvSpPr>
+            <a:spLocks noGrp="1"/>
+          </p:cNvSpPr>
+          <p:nvPr>
+            <p:ph type="body" idx="1"/>
+          </p:nvPr>
+        </p:nvSpPr>
+        <p:spPr/>
+        <p:txBody>
+          <a:bodyPr/>
+          <a:lstStyle/>
+          <a:p>
+            <a:r>
+              <a:rPr lang="en-US" dirty="0"/>
+              <a:t>This diagram shows the flow of the program before the “Start Processing” button has been clicked.</a:t>
+            </a:r>
+          </a:p>
+          <a:p>
+            <a:endParaRPr lang="en-US" dirty="0"/>
+          </a:p>
+          <a:p>
+            <a:r>
+              <a:rPr lang="en-US" dirty="0"/>
+              <a:t>The user specifies input/output files, they must make a decision between browsing for a file or manually inputting the file path.</a:t>
+            </a:r>
+          </a:p>
+          <a:p>
+            <a:endParaRPr lang="en-US" dirty="0"/>
+          </a:p>
+          <a:p>
+            <a:r>
+              <a:rPr lang="en-US" dirty="0"/>
+              <a:t>The user then repeats this step with the E, F, and G coordinates by either typing in the individual values or loading them from a properly formatted file.</a:t>
+            </a:r>
+          </a:p>
+          <a:p>
+            <a:endParaRPr lang="en-US" dirty="0"/>
+          </a:p>
+          <a:p>
+            <a:r>
+              <a:rPr lang="en-US" dirty="0"/>
+              <a:t>The user then begins the processing stage.</a:t>
+            </a:r>
+          </a:p>
+        </p:txBody>
+      </p:sp>
+    </p:spTree>
+    <p:extLst>
+      <p:ext uri="{BB962C8B-B14F-4D97-AF65-F5344CB8AC3E}">
+        <p14:creationId xmlns:p14="http://schemas.microsoft.com/office/powerpoint/2010/main" val="993874130"/>
+      </p:ext>
+    </p:extLst>
+  </p:cSld>
+  <p:clrMapOvr>
+    <a:masterClrMapping/>
+  </p:clrMapOvr>
+</p:notes>
+</file>
+
+<file path=ppt/notesSlides/notesSlide13.xml><?xml version="1.0" encoding="utf-8"?>
+<p:notes xmlns:a="http://schemas.openxmlformats.org/drawingml/2006/main" xmlns:r="http://schemas.openxmlformats.org/officeDocument/2006/relationships" xmlns:p="http://schemas.openxmlformats.org/presentationml/2006/main">
+  <p:cSld>
+    <p:spTree>
+      <p:nvGrpSpPr>
+        <p:cNvPr id="1" name=""/>
+        <p:cNvGrpSpPr/>
+        <p:nvPr/>
+      </p:nvGrpSpPr>
+      <p:grpSpPr>
+        <a:xfrm>
+          <a:off x="0" y="0"/>
+          <a:ext cx="0" cy="0"/>
+          <a:chOff x="0" y="0"/>
+          <a:chExt cx="0" cy="0"/>
+        </a:xfrm>
+      </p:grpSpPr>
+      <p:sp>
+        <p:nvSpPr>
+          <p:cNvPr id="2" name="Slide Image Placeholder 1"/>
+          <p:cNvSpPr>
+            <a:spLocks noGrp="1" noRot="1" noChangeAspect="1"/>
+          </p:cNvSpPr>
+          <p:nvPr>
+            <p:ph type="sldImg"/>
+          </p:nvPr>
+        </p:nvSpPr>
+        <p:spPr/>
+      </p:sp>
+      <p:sp>
+        <p:nvSpPr>
+          <p:cNvPr id="3" name="Notes Placeholder 2"/>
+          <p:cNvSpPr>
+            <a:spLocks noGrp="1"/>
+          </p:cNvSpPr>
+          <p:nvPr>
+            <p:ph type="body" idx="1"/>
+          </p:nvPr>
+        </p:nvSpPr>
+        <p:spPr/>
+        <p:txBody>
+          <a:bodyPr/>
+          <a:lstStyle/>
+          <a:p>
+            <a:r>
+              <a:rPr lang="en-US" dirty="0"/>
+              <a:t>The first part of the processing portion involves checking the input files and text entry fields for errors.</a:t>
+            </a:r>
+          </a:p>
+        </p:txBody>
+      </p:sp>
+    </p:spTree>
+    <p:extLst>
+      <p:ext uri="{BB962C8B-B14F-4D97-AF65-F5344CB8AC3E}">
+        <p14:creationId xmlns:p14="http://schemas.microsoft.com/office/powerpoint/2010/main" val="3584201889"/>
+      </p:ext>
+    </p:extLst>
+  </p:cSld>
+  <p:clrMapOvr>
+    <a:masterClrMapping/>
+  </p:clrMapOvr>
+</p:notes>
+</file>
+
+<file path=ppt/notesSlides/notesSlide14.xml><?xml version="1.0" encoding="utf-8"?>
+<p:notes xmlns:a="http://schemas.openxmlformats.org/drawingml/2006/main" xmlns:r="http://schemas.openxmlformats.org/officeDocument/2006/relationships" xmlns:p="http://schemas.openxmlformats.org/presentationml/2006/main">
+  <p:cSld>
+    <p:spTree>
+      <p:nvGrpSpPr>
+        <p:cNvPr id="1" name=""/>
+        <p:cNvGrpSpPr/>
+        <p:nvPr/>
+      </p:nvGrpSpPr>
+      <p:grpSpPr>
+        <a:xfrm>
+          <a:off x="0" y="0"/>
+          <a:ext cx="0" cy="0"/>
+          <a:chOff x="0" y="0"/>
+          <a:chExt cx="0" cy="0"/>
+        </a:xfrm>
+      </p:grpSpPr>
+      <p:sp>
+        <p:nvSpPr>
+          <p:cNvPr id="2" name="Slide Image Placeholder 1"/>
+          <p:cNvSpPr>
+            <a:spLocks noGrp="1" noRot="1" noChangeAspect="1"/>
+          </p:cNvSpPr>
+          <p:nvPr>
+            <p:ph type="sldImg"/>
+          </p:nvPr>
+        </p:nvSpPr>
+        <p:spPr/>
+      </p:sp>
+      <p:sp>
+        <p:nvSpPr>
+          <p:cNvPr id="3" name="Notes Placeholder 2"/>
+          <p:cNvSpPr>
+            <a:spLocks noGrp="1"/>
+          </p:cNvSpPr>
+          <p:nvPr>
+            <p:ph type="body" idx="1"/>
+          </p:nvPr>
+        </p:nvSpPr>
+        <p:spPr/>
+        <p:txBody>
+          <a:bodyPr>
+            <a:normAutofit fontScale="85000" lnSpcReduction="10000"/>
+          </a:bodyPr>
+          <a:lstStyle/>
+          <a:p>
+            <a:r>
+              <a:rPr lang="en-US" dirty="0"/>
+              <a:t>A ring buffer has subtle differences to a standard buffer.</a:t>
+            </a:r>
+          </a:p>
+          <a:p>
+            <a:endParaRPr lang="en-US" dirty="0"/>
+          </a:p>
+          <a:p>
+            <a:r>
+              <a:rPr lang="en-US" dirty="0"/>
+              <a:t>The ring buffer requires keeping track of the read and write indexes. </a:t>
+            </a:r>
+          </a:p>
+          <a:p>
+            <a:r>
+              <a:rPr lang="en-US" dirty="0"/>
+              <a:t>	The write index indicates the next value to store a value into.</a:t>
+            </a:r>
+          </a:p>
+          <a:p>
+            <a:r>
+              <a:rPr lang="en-US" dirty="0"/>
+              <a:t>	The read index indicates the first index that non-processed data is located</a:t>
+            </a:r>
+          </a:p>
+          <a:p>
+            <a:endParaRPr lang="en-US" dirty="0"/>
+          </a:p>
+          <a:p>
+            <a:r>
+              <a:rPr lang="en-US" dirty="0"/>
+              <a:t>	The size specifies the total size of currently buffered data. Not the maximum size of the ring buffer.</a:t>
+            </a:r>
+          </a:p>
+          <a:p>
+            <a:endParaRPr lang="en-US" dirty="0"/>
+          </a:p>
+          <a:p>
+            <a:r>
+              <a:rPr lang="en-US" dirty="0"/>
+              <a:t>When writing or reading to the end of the ring buffer, the pointers wrap around to the beginning.</a:t>
+            </a:r>
+          </a:p>
+          <a:p>
+            <a:endParaRPr lang="en-US" dirty="0"/>
+          </a:p>
+          <a:p>
+            <a:r>
+              <a:rPr lang="en-US" dirty="0"/>
+              <a:t>When the read and the write pointers meet this indicates that no more data is stored in the buffer</a:t>
+            </a:r>
+          </a:p>
+          <a:p>
+            <a:endParaRPr lang="en-US" dirty="0"/>
+          </a:p>
+          <a:p>
+            <a:r>
+              <a:rPr lang="en-US" dirty="0"/>
+              <a:t>- </a:t>
+            </a:r>
+            <a:r>
+              <a:rPr lang="en-US" sz="2400" dirty="0"/>
+              <a:t>Ring Buffer Design</a:t>
+            </a:r>
+          </a:p>
+          <a:p>
+            <a:pPr lvl="1"/>
+            <a:r>
+              <a:rPr lang="en-US" sz="2000" dirty="0"/>
+              <a:t>Read Pointer</a:t>
+            </a:r>
+          </a:p>
+          <a:p>
+            <a:pPr lvl="1"/>
+            <a:r>
+              <a:rPr lang="en-US" sz="2000" dirty="0"/>
+              <a:t>Write Pointer</a:t>
+            </a:r>
+          </a:p>
+          <a:p>
+            <a:pPr lvl="1"/>
+            <a:r>
+              <a:rPr lang="en-US" sz="2000" dirty="0"/>
+              <a:t>Max Buffer size of 8192</a:t>
+            </a:r>
+          </a:p>
+          <a:p>
+            <a:r>
+              <a:rPr lang="en-US" sz="2400" dirty="0"/>
+              <a:t>How is a Ring Buffer different from a linear buffer?</a:t>
+            </a:r>
+          </a:p>
+          <a:p>
+            <a:pPr lvl="1"/>
+            <a:r>
+              <a:rPr lang="en-US" sz="2000" dirty="0"/>
+              <a:t>Wrap around</a:t>
+            </a:r>
+          </a:p>
+          <a:p>
+            <a:pPr lvl="1"/>
+            <a:r>
+              <a:rPr lang="en-US" sz="2000" dirty="0"/>
+              <a:t>Edge Case 1: Reading up to the write pointer</a:t>
+            </a:r>
+            <a:endParaRPr lang="en-US" sz="1600" dirty="0"/>
+          </a:p>
+          <a:p>
+            <a:pPr lvl="1"/>
+            <a:r>
+              <a:rPr lang="en-US" sz="2000" dirty="0"/>
+              <a:t>Edge Case 2: Writing up to the read pointer</a:t>
+            </a:r>
+          </a:p>
+          <a:p>
+            <a:pPr lvl="1"/>
+            <a:r>
+              <a:rPr lang="en-US" sz="2000" dirty="0"/>
+              <a:t>Edge Case 3: Wrapping around back to the beginning</a:t>
+            </a:r>
+          </a:p>
+          <a:p>
+            <a:endParaRPr lang="en-US" dirty="0"/>
+          </a:p>
+        </p:txBody>
+      </p:sp>
+    </p:spTree>
+    <p:extLst>
+      <p:ext uri="{BB962C8B-B14F-4D97-AF65-F5344CB8AC3E}">
+        <p14:creationId xmlns:p14="http://schemas.microsoft.com/office/powerpoint/2010/main" val="3380635002"/>
+      </p:ext>
+    </p:extLst>
+  </p:cSld>
+  <p:clrMapOvr>
+    <a:masterClrMapping/>
+  </p:clrMapOvr>
+</p:notes>
+</file>
+
+<file path=ppt/notesSlides/notesSlide15.xml><?xml version="1.0" encoding="utf-8"?>
+<p:notes xmlns:a="http://schemas.openxmlformats.org/drawingml/2006/main" xmlns:r="http://schemas.openxmlformats.org/officeDocument/2006/relationships" xmlns:p="http://schemas.openxmlformats.org/presentationml/2006/main">
+  <p:cSld>
+    <p:spTree>
+      <p:nvGrpSpPr>
+        <p:cNvPr id="1" name=""/>
+        <p:cNvGrpSpPr/>
+        <p:nvPr/>
+      </p:nvGrpSpPr>
+      <p:grpSpPr>
+        <a:xfrm>
+          <a:off x="0" y="0"/>
+          <a:ext cx="0" cy="0"/>
+          <a:chOff x="0" y="0"/>
+          <a:chExt cx="0" cy="0"/>
+        </a:xfrm>
+      </p:grpSpPr>
+      <p:sp>
+        <p:nvSpPr>
+          <p:cNvPr id="2" name="Slide Image Placeholder 1"/>
+          <p:cNvSpPr>
+            <a:spLocks noGrp="1" noRot="1" noChangeAspect="1"/>
+          </p:cNvSpPr>
+          <p:nvPr>
+            <p:ph type="sldImg"/>
+          </p:nvPr>
+        </p:nvSpPr>
+        <p:spPr/>
+      </p:sp>
+      <p:sp>
+        <p:nvSpPr>
+          <p:cNvPr id="3" name="Notes Placeholder 2"/>
+          <p:cNvSpPr>
+            <a:spLocks noGrp="1"/>
+          </p:cNvSpPr>
+          <p:nvPr>
+            <p:ph type="body" idx="1"/>
+          </p:nvPr>
+        </p:nvSpPr>
+        <p:spPr/>
+        <p:txBody>
+          <a:bodyPr/>
+          <a:lstStyle/>
+          <a:p>
+            <a:pPr marL="0" indent="0">
+              <a:buFontTx/>
+              <a:buNone/>
+            </a:pPr>
+            <a:r>
+              <a:rPr lang="en-US" dirty="0"/>
+              <a:t>[talk about the CRC checking performed per message]</a:t>
+            </a:r>
+          </a:p>
+          <a:p>
+            <a:pPr marL="0" indent="0">
+              <a:buFontTx/>
+              <a:buNone/>
+            </a:pPr>
+            <a:endParaRPr lang="en-US" dirty="0"/>
+          </a:p>
+          <a:p>
+            <a:pPr marL="0" indent="0">
+              <a:buFontTx/>
+              <a:buNone/>
+            </a:pPr>
+            <a:r>
+              <a:rPr lang="en-US" dirty="0"/>
+              <a:t>[talk about the error checking]</a:t>
+            </a:r>
+          </a:p>
+          <a:p>
+            <a:pPr marL="0" indent="0">
+              <a:buFontTx/>
+              <a:buNone/>
+            </a:pPr>
+            <a:endParaRPr lang="en-US" dirty="0"/>
+          </a:p>
+          <a:p>
+            <a:pPr marL="0" indent="0">
+              <a:buFontTx/>
+              <a:buNone/>
+            </a:pPr>
+            <a:r>
+              <a:rPr lang="en-US" dirty="0"/>
+              <a:t>[specify that finding more range and time messages results in updating the UTC offset and number of GPS satellites to the most recently attained values]</a:t>
+            </a:r>
+          </a:p>
+        </p:txBody>
+      </p:sp>
+    </p:spTree>
+    <p:extLst>
+      <p:ext uri="{BB962C8B-B14F-4D97-AF65-F5344CB8AC3E}">
+        <p14:creationId xmlns:p14="http://schemas.microsoft.com/office/powerpoint/2010/main" val="2049423187"/>
+      </p:ext>
+    </p:extLst>
+  </p:cSld>
+  <p:clrMapOvr>
+    <a:masterClrMapping/>
+  </p:clrMapOvr>
+</p:notes>
+</file>
+
+<file path=ppt/notesSlides/notesSlide16.xml><?xml version="1.0" encoding="utf-8"?>
+<p:notes xmlns:a="http://schemas.openxmlformats.org/drawingml/2006/main" xmlns:r="http://schemas.openxmlformats.org/officeDocument/2006/relationships" xmlns:p="http://schemas.openxmlformats.org/presentationml/2006/main">
+  <p:cSld>
+    <p:spTree>
+      <p:nvGrpSpPr>
+        <p:cNvPr id="1" name=""/>
+        <p:cNvGrpSpPr/>
+        <p:nvPr/>
+      </p:nvGrpSpPr>
+      <p:grpSpPr>
+        <a:xfrm>
+          <a:off x="0" y="0"/>
+          <a:ext cx="0" cy="0"/>
+          <a:chOff x="0" y="0"/>
+          <a:chExt cx="0" cy="0"/>
+        </a:xfrm>
+      </p:grpSpPr>
+      <p:sp>
+        <p:nvSpPr>
+          <p:cNvPr id="2" name="Slide Image Placeholder 1"/>
+          <p:cNvSpPr>
+            <a:spLocks noGrp="1" noRot="1" noChangeAspect="1"/>
+          </p:cNvSpPr>
+          <p:nvPr>
+            <p:ph type="sldImg"/>
+          </p:nvPr>
+        </p:nvSpPr>
+        <p:spPr/>
+      </p:sp>
+      <p:sp>
+        <p:nvSpPr>
+          <p:cNvPr id="3" name="Notes Placeholder 2"/>
+          <p:cNvSpPr>
+            <a:spLocks noGrp="1"/>
+          </p:cNvSpPr>
+          <p:nvPr>
+            <p:ph type="body" idx="1"/>
+          </p:nvPr>
+        </p:nvSpPr>
+        <p:spPr/>
+        <p:txBody>
+          <a:bodyPr/>
+          <a:lstStyle/>
+          <a:p>
+            <a:r>
+              <a:rPr lang="en-US" dirty="0"/>
+              <a:t>[talk about what can be done with the formatted data]</a:t>
+            </a:r>
+          </a:p>
+          <a:p>
+            <a:r>
+              <a:rPr lang="en-US" dirty="0"/>
+              <a:t>[What is the significance of the data]</a:t>
+            </a:r>
+          </a:p>
+          <a:p>
+            <a:r>
+              <a:rPr lang="en-US" dirty="0"/>
+              <a:t>	The extracted and calculated data can be used to identify and debug sensor issues</a:t>
+            </a:r>
+          </a:p>
+        </p:txBody>
+      </p:sp>
+    </p:spTree>
+    <p:extLst>
+      <p:ext uri="{BB962C8B-B14F-4D97-AF65-F5344CB8AC3E}">
+        <p14:creationId xmlns:p14="http://schemas.microsoft.com/office/powerpoint/2010/main" val="282378620"/>
       </p:ext>
     </p:extLst>
   </p:cSld>
@@ -779,7 +1454,7 @@
           <a:p>
             <a:r>
               <a:rPr lang="en-US" dirty="0"/>
-              <a:t>TSPI relies on ground reference receiver units for its operations. </a:t>
+              <a:t>TSPI relies on GPS receivers for its operations. </a:t>
             </a:r>
           </a:p>
           <a:p>
@@ -807,6 +1482,18 @@
             <a:r>
               <a:rPr lang="en-US" dirty="0"/>
               <a:t>The BestXYZ processor allows the differences between a user entered position and collected messages to be compared for potential issues.</a:t>
+            </a:r>
+          </a:p>
+          <a:p>
+            <a:endParaRPr lang="en-US" dirty="0"/>
+          </a:p>
+          <a:p>
+            <a:endParaRPr lang="en-US" dirty="0"/>
+          </a:p>
+          <a:p>
+            <a:r>
+              <a:rPr lang="en-US" dirty="0"/>
+              <a:t>[Reference receiver rovers]</a:t>
             </a:r>
           </a:p>
         </p:txBody>
@@ -887,7 +1574,96 @@
             </a:pPr>
             <a:r>
               <a:rPr lang="en-US" dirty="0"/>
-              <a:t>The BestXYZ Processor intends to parse Range, Time, and BestXYZ messages for useful data that is then formatted in a tabular form. A running log file is populated with post runtime statistics such as start time and end time for the current run.</a:t>
+              <a:t>The BestXYZ Processor accepts two inputs: </a:t>
+            </a:r>
+          </a:p>
+          <a:p>
+            <a:pPr marL="0" marR="0" lvl="0" indent="0" algn="l" defTabSz="914400" rtl="0" eaLnBrk="1" fontAlgn="auto" latinLnBrk="0" hangingPunct="1">
+              <a:lnSpc>
+                <a:spcPct val="100000"/>
+              </a:lnSpc>
+              <a:spcBef>
+                <a:spcPts val="0"/>
+              </a:spcBef>
+              <a:spcAft>
+                <a:spcPts val="0"/>
+              </a:spcAft>
+              <a:buClrTx/>
+              <a:buSzTx/>
+              <a:buFontTx/>
+              <a:buNone/>
+              <a:tabLst/>
+              <a:defRPr/>
+            </a:pPr>
+            <a:r>
+              <a:rPr lang="en-US" dirty="0"/>
+              <a:t>	A Novatel Data File containing Range, Time, and BestXYZ messages. </a:t>
+            </a:r>
+          </a:p>
+          <a:p>
+            <a:pPr marL="0" marR="0" lvl="0" indent="0" algn="l" defTabSz="914400" rtl="0" eaLnBrk="1" fontAlgn="auto" latinLnBrk="0" hangingPunct="1">
+              <a:lnSpc>
+                <a:spcPct val="100000"/>
+              </a:lnSpc>
+              <a:spcBef>
+                <a:spcPts val="0"/>
+              </a:spcBef>
+              <a:spcAft>
+                <a:spcPts val="0"/>
+              </a:spcAft>
+              <a:buClrTx/>
+              <a:buSzTx/>
+              <a:buFontTx/>
+              <a:buNone/>
+              <a:tabLst/>
+              <a:defRPr/>
+            </a:pPr>
+            <a:r>
+              <a:rPr lang="en-US" dirty="0"/>
+              <a:t>	And a user entered Earth Centered Earth Fixed as E, F, and G coordinates in meters</a:t>
+            </a:r>
+          </a:p>
+          <a:p>
+            <a:pPr marL="0" marR="0" lvl="0" indent="0" algn="l" defTabSz="914400" rtl="0" eaLnBrk="1" fontAlgn="auto" latinLnBrk="0" hangingPunct="1">
+              <a:lnSpc>
+                <a:spcPct val="100000"/>
+              </a:lnSpc>
+              <a:spcBef>
+                <a:spcPts val="0"/>
+              </a:spcBef>
+              <a:spcAft>
+                <a:spcPts val="0"/>
+              </a:spcAft>
+              <a:buClrTx/>
+              <a:buSzTx/>
+              <a:buFontTx/>
+              <a:buNone/>
+              <a:tabLst/>
+              <a:defRPr/>
+            </a:pPr>
+            <a:endParaRPr lang="en-US" dirty="0"/>
+          </a:p>
+          <a:p>
+            <a:pPr marL="0" marR="0" lvl="0" indent="0" algn="l" defTabSz="914400" rtl="0" eaLnBrk="1" fontAlgn="auto" latinLnBrk="0" hangingPunct="1">
+              <a:lnSpc>
+                <a:spcPct val="100000"/>
+              </a:lnSpc>
+              <a:spcBef>
+                <a:spcPts val="0"/>
+              </a:spcBef>
+              <a:spcAft>
+                <a:spcPts val="0"/>
+              </a:spcAft>
+              <a:buClrTx/>
+              <a:buSzTx/>
+              <a:buFontTx/>
+              <a:buNone/>
+              <a:tabLst/>
+              <a:defRPr/>
+            </a:pPr>
+            <a:r>
+              <a:rPr lang="en-US" dirty="0"/>
+              <a:t>The application parses messages for useful data that is then formatted into a tabular spreadsheet format. A running log file is populated with post runtime statistics such as start time and end time for the current run.</a:t>
             </a:r>
           </a:p>
           <a:p>
@@ -954,7 +1730,76 @@
           <a:p>
             <a:r>
               <a:rPr lang="en-US" dirty="0"/>
-              <a:t>- Talk about how the project was not using any controlled information and is only for personal use only to emulate a version control environment for the intern project.</a:t>
+              <a:t>Qt was used to create an interactive GUI interface. Qt was also used to handle the background processing thread without locking the GUI</a:t>
+            </a:r>
+          </a:p>
+          <a:p>
+            <a:endParaRPr lang="en-US" dirty="0"/>
+          </a:p>
+          <a:p>
+            <a:r>
+              <a:rPr lang="en-US" dirty="0"/>
+              <a:t>C++ was the primary language used with QT. </a:t>
+            </a:r>
+          </a:p>
+          <a:p>
+            <a:r>
+              <a:rPr lang="en-US" dirty="0"/>
+              <a:t>	The file parsing, ring buffer implementation, and writing to output files was all done using the standard C++ libraries</a:t>
+            </a:r>
+          </a:p>
+          <a:p>
+            <a:endParaRPr lang="en-US" dirty="0"/>
+          </a:p>
+          <a:p>
+            <a:r>
+              <a:rPr lang="en-US" dirty="0"/>
+              <a:t>The project did not contain any sensitive information. As such the use of GitHub was purely for the emulation of a version control environment.</a:t>
+            </a:r>
+          </a:p>
+          <a:p>
+            <a:endParaRPr lang="en-US" dirty="0"/>
+          </a:p>
+          <a:p>
+            <a:r>
+              <a:rPr lang="en-US" dirty="0"/>
+              <a:t>A subset of the TSPI Agile methodology was used during the development process. </a:t>
+            </a:r>
+          </a:p>
+          <a:p>
+            <a:r>
+              <a:rPr lang="en-US" dirty="0"/>
+              <a:t>	The User Stories helped to ensure requirements were being met</a:t>
+            </a:r>
+          </a:p>
+          <a:p>
+            <a:r>
+              <a:rPr lang="en-US" dirty="0"/>
+              <a:t>	The RDITs were used to extract a more concrete set of requirements from the User Stories.</a:t>
+            </a:r>
+          </a:p>
+          <a:p>
+            <a:r>
+              <a:rPr lang="en-US" dirty="0"/>
+              <a:t>	They were also used to go into more detail on the Design and implementation.</a:t>
+            </a:r>
+          </a:p>
+          <a:p>
+            <a:r>
+              <a:rPr lang="en-US" dirty="0"/>
+              <a:t>	The documentation provided one more benefit.</a:t>
+            </a:r>
+          </a:p>
+          <a:p>
+            <a:r>
+              <a:rPr lang="en-US" dirty="0"/>
+              <a:t>	It gives a set of steps for future users and developers to follow when testing the program for error conditions such as an incorrectly specified file path</a:t>
+            </a:r>
+          </a:p>
+          <a:p>
+            <a:r>
+              <a:rPr lang="en-US" dirty="0"/>
+              <a:t>	</a:t>
             </a:r>
           </a:p>
         </p:txBody>
@@ -1016,14 +1861,17 @@
           <a:bodyPr/>
           <a:lstStyle/>
           <a:p>
-            <a:endParaRPr lang="en-US" dirty="0"/>
+            <a:r>
+              <a:rPr lang="en-US" dirty="0"/>
+              <a:t>Next Ill be going over how simple it is to use the application</a:t>
+            </a:r>
           </a:p>
         </p:txBody>
       </p:sp>
     </p:spTree>
     <p:extLst>
       <p:ext uri="{BB962C8B-B14F-4D97-AF65-F5344CB8AC3E}">
-        <p14:creationId xmlns:p14="http://schemas.microsoft.com/office/powerpoint/2010/main" val="2084178233"/>
+        <p14:creationId xmlns:p14="http://schemas.microsoft.com/office/powerpoint/2010/main" val="479557889"/>
       </p:ext>
     </p:extLst>
   </p:cSld>
@@ -1079,7 +1927,28 @@
           <a:p>
             <a:r>
               <a:rPr lang="en-US" dirty="0"/>
-              <a:t>-Change the “Begin Parsing Input Message”</a:t>
+              <a:t>At the very top of the application, the user can specify input, output, and log file paths through two methods.</a:t>
+            </a:r>
+          </a:p>
+          <a:p>
+            <a:r>
+              <a:rPr lang="en-US" dirty="0"/>
+              <a:t>	The user has the option to browse for a file. Upon browsing for a file the file path will populate the appropriate text field.</a:t>
+            </a:r>
+          </a:p>
+          <a:p>
+            <a:r>
+              <a:rPr lang="en-US" dirty="0"/>
+              <a:t>	The user also has the option to directly enter the file path manually.</a:t>
+            </a:r>
+          </a:p>
+          <a:p>
+            <a:endParaRPr lang="en-US" dirty="0"/>
+          </a:p>
+          <a:p>
+            <a:r>
+              <a:rPr lang="en-US" dirty="0"/>
+              <a:t>Only the Input file path is required. If no output or log file paths are specified, then they will automatically be generated for the user during the processing stage, based on the input file path.</a:t>
             </a:r>
           </a:p>
         </p:txBody>
@@ -1087,7 +1956,7 @@
     </p:spTree>
     <p:extLst>
       <p:ext uri="{BB962C8B-B14F-4D97-AF65-F5344CB8AC3E}">
-        <p14:creationId xmlns:p14="http://schemas.microsoft.com/office/powerpoint/2010/main" val="3584201889"/>
+        <p14:creationId xmlns:p14="http://schemas.microsoft.com/office/powerpoint/2010/main" val="1816947775"/>
       </p:ext>
     </p:extLst>
   </p:cSld>
@@ -1143,67 +2012,34 @@
           <a:p>
             <a:r>
               <a:rPr lang="en-US" dirty="0"/>
-              <a:t>- </a:t>
-            </a:r>
-            <a:r>
-              <a:rPr lang="en-US" sz="2400" dirty="0"/>
-              <a:t>Ring Buffer Design</a:t>
-            </a:r>
-          </a:p>
-          <a:p>
-            <a:pPr lvl="1"/>
-            <a:r>
-              <a:rPr lang="en-US" sz="2000" dirty="0"/>
-              <a:t>Read Pointer</a:t>
-            </a:r>
-          </a:p>
-          <a:p>
-            <a:pPr lvl="1"/>
-            <a:r>
-              <a:rPr lang="en-US" sz="2000" dirty="0"/>
-              <a:t>Write Pointer</a:t>
-            </a:r>
-          </a:p>
-          <a:p>
-            <a:pPr lvl="1"/>
-            <a:r>
-              <a:rPr lang="en-US" sz="2000" dirty="0"/>
-              <a:t>Max Buffer size of 8192</a:t>
-            </a:r>
-          </a:p>
-          <a:p>
-            <a:r>
-              <a:rPr lang="en-US" sz="2400" dirty="0"/>
-              <a:t>How is a Ring Buffer different from a linear buffer?</a:t>
-            </a:r>
-          </a:p>
-          <a:p>
-            <a:pPr lvl="1"/>
-            <a:r>
-              <a:rPr lang="en-US" sz="2000" dirty="0"/>
-              <a:t>Wrap around</a:t>
-            </a:r>
-          </a:p>
-          <a:p>
-            <a:pPr lvl="1"/>
-            <a:r>
-              <a:rPr lang="en-US" sz="2000" dirty="0"/>
-              <a:t>Edge Case 1: Reading up to the write pointer</a:t>
-            </a:r>
-            <a:endParaRPr lang="en-US" sz="1600" dirty="0"/>
-          </a:p>
-          <a:p>
-            <a:pPr lvl="1"/>
-            <a:r>
-              <a:rPr lang="en-US" sz="2000" dirty="0"/>
-              <a:t>Edge Case 2: Writing up to the read pointer</a:t>
-            </a:r>
-          </a:p>
-          <a:p>
-            <a:pPr lvl="1"/>
-            <a:r>
-              <a:rPr lang="en-US" sz="2000" dirty="0"/>
-              <a:t>Edge Case 3: Wrapping around back to the beginning</a:t>
+              <a:t>The user is required to enter a GPS Antenna position that will be used for calculating positional differences.</a:t>
+            </a:r>
+          </a:p>
+          <a:p>
+            <a:endParaRPr lang="en-US" dirty="0"/>
+          </a:p>
+          <a:p>
+            <a:r>
+              <a:rPr lang="en-US" dirty="0"/>
+              <a:t>The Earth Centered Earth Fixed E, F, and G Coordinates must be specified in meters.</a:t>
+            </a:r>
+          </a:p>
+          <a:p>
+            <a:endParaRPr lang="en-US" dirty="0"/>
+          </a:p>
+          <a:p>
+            <a:r>
+              <a:rPr lang="en-US" dirty="0"/>
+              <a:t>Much like the input and output files, the position can be manually entered into the E, F, and G text entry fields. Or they can be loaded from a file.</a:t>
+            </a:r>
+          </a:p>
+          <a:p>
+            <a:endParaRPr lang="en-US" dirty="0"/>
+          </a:p>
+          <a:p>
+            <a:r>
+              <a:rPr lang="en-US" dirty="0"/>
+              <a:t>If they are loaded from a file, then the format must contain three comma separated floating point values that are all on the same line.</a:t>
             </a:r>
           </a:p>
           <a:p>
@@ -1214,7 +2050,7 @@
     </p:spTree>
     <p:extLst>
       <p:ext uri="{BB962C8B-B14F-4D97-AF65-F5344CB8AC3E}">
-        <p14:creationId xmlns:p14="http://schemas.microsoft.com/office/powerpoint/2010/main" val="3380635002"/>
+        <p14:creationId xmlns:p14="http://schemas.microsoft.com/office/powerpoint/2010/main" val="3159683825"/>
       </p:ext>
     </p:extLst>
   </p:cSld>
@@ -1268,23 +2104,9 @@
           <a:bodyPr/>
           <a:lstStyle/>
           <a:p>
-            <a:pPr marL="171450" indent="-171450">
-              <a:buFontTx/>
-              <a:buChar char="-"/>
-            </a:pPr>
             <a:r>
               <a:rPr lang="en-US" dirty="0"/>
-              <a:t>Range and Time</a:t>
-            </a:r>
-          </a:p>
-          <a:p>
-            <a:pPr marL="171450" indent="-171450">
-              <a:buFontTx/>
-              <a:buChar char="-"/>
-            </a:pPr>
-            <a:r>
-              <a:rPr lang="en-US" dirty="0"/>
-              <a:t>BestXYZ</a:t>
+              <a:t>At this stage in the program the user will be ready to click the “Start Processing” button. </a:t>
             </a:r>
           </a:p>
         </p:txBody>
@@ -1292,7 +2114,7 @@
     </p:spTree>
     <p:extLst>
       <p:ext uri="{BB962C8B-B14F-4D97-AF65-F5344CB8AC3E}">
-        <p14:creationId xmlns:p14="http://schemas.microsoft.com/office/powerpoint/2010/main" val="2049423187"/>
+        <p14:creationId xmlns:p14="http://schemas.microsoft.com/office/powerpoint/2010/main" val="117831171"/>
       </p:ext>
     </p:extLst>
   </p:cSld>
@@ -1348,7 +2170,7 @@
           <a:p>
             <a:r>
               <a:rPr lang="en-US" dirty="0"/>
-              <a:t>-Tie everything back in from the intro slide to how it was handled</a:t>
+              <a:t>As the program is processing the user specified input file and GPS antenna position, the GUI disables the interactive buttons and text entry fields until it is completely done processing the information</a:t>
             </a:r>
           </a:p>
         </p:txBody>
@@ -1356,7 +2178,7 @@
     </p:spTree>
     <p:extLst>
       <p:ext uri="{BB962C8B-B14F-4D97-AF65-F5344CB8AC3E}">
-        <p14:creationId xmlns:p14="http://schemas.microsoft.com/office/powerpoint/2010/main" val="282378620"/>
+        <p14:creationId xmlns:p14="http://schemas.microsoft.com/office/powerpoint/2010/main" val="3614591690"/>
       </p:ext>
     </p:extLst>
   </p:cSld>
@@ -10818,7 +11640,7 @@
           <a:p>
             <a:r>
               <a:rPr lang="en-US" dirty="0"/>
-              <a:t>Processing Complete(cont.)</a:t>
+              <a:t>Processing Complete</a:t>
             </a:r>
           </a:p>
         </p:txBody>
@@ -10840,55 +11662,13 @@
           <a:p>
             <a:r>
               <a:rPr lang="en-US" sz="2400" dirty="0"/>
-              <a:t>The extracted and calculated information has been written into the output files.</a:t>
-            </a:r>
-          </a:p>
-          <a:p>
-            <a:pPr lvl="1"/>
-            <a:r>
-              <a:rPr lang="en-US" sz="2000" dirty="0"/>
-              <a:t>Output Data File</a:t>
-            </a:r>
-          </a:p>
-          <a:p>
-            <a:pPr marL="457200" lvl="1" indent="0">
-              <a:buNone/>
-            </a:pPr>
-            <a:endParaRPr lang="en-US" sz="2000" dirty="0"/>
-          </a:p>
-          <a:p>
-            <a:pPr marL="457200" lvl="1" indent="0">
-              <a:buNone/>
-            </a:pPr>
-            <a:endParaRPr lang="en-US" sz="2000" dirty="0"/>
-          </a:p>
-          <a:p>
-            <a:pPr marL="457200" lvl="1" indent="0">
-              <a:buNone/>
-            </a:pPr>
-            <a:endParaRPr lang="en-US" sz="2000" dirty="0"/>
-          </a:p>
-          <a:p>
-            <a:pPr marL="457200" lvl="1" indent="0">
-              <a:buNone/>
-            </a:pPr>
-            <a:endParaRPr lang="en-US" sz="2000" dirty="0"/>
-          </a:p>
-          <a:p>
-            <a:pPr marL="457200" lvl="1" indent="0">
-              <a:buNone/>
-            </a:pPr>
-            <a:endParaRPr lang="en-US" sz="2000" dirty="0"/>
-          </a:p>
-          <a:p>
-            <a:pPr lvl="1"/>
-            <a:endParaRPr lang="en-US" sz="2000" dirty="0"/>
-          </a:p>
-          <a:p>
-            <a:pPr lvl="1"/>
-            <a:r>
-              <a:rPr lang="en-US" sz="2000" dirty="0"/>
-              <a:t>Log File</a:t>
+              <a:t>GUI elements are re-enabled</a:t>
+            </a:r>
+          </a:p>
+          <a:p>
+            <a:r>
+              <a:rPr lang="en-US" sz="2400" dirty="0"/>
+              <a:t>Processing information is updated</a:t>
             </a:r>
           </a:p>
         </p:txBody>
@@ -10946,6 +11726,249 @@
                 <a:defRPr/>
               </a:pPr>
               <a:t>10</a:t>
+            </a:fld>
+            <a:endParaRPr lang="en-US" dirty="0"/>
+          </a:p>
+        </p:txBody>
+      </p:sp>
+      <p:pic>
+        <p:nvPicPr>
+          <p:cNvPr id="7" name="Picture 6">
+            <a:extLst>
+              <a:ext uri="{FF2B5EF4-FFF2-40B4-BE49-F238E27FC236}">
+                <a16:creationId xmlns:a16="http://schemas.microsoft.com/office/drawing/2014/main" id="{E0F8EACF-87B9-40ED-BC00-004B8DE45828}"/>
+              </a:ext>
+            </a:extLst>
+          </p:cNvPr>
+          <p:cNvPicPr/>
+          <p:nvPr/>
+        </p:nvPicPr>
+        <p:blipFill rotWithShape="1">
+          <a:blip r:embed="rId3"/>
+          <a:srcRect b="50000"/>
+          <a:stretch/>
+        </p:blipFill>
+        <p:spPr>
+          <a:xfrm>
+            <a:off x="538162" y="2286000"/>
+            <a:ext cx="3657601" cy="3190875"/>
+          </a:xfrm>
+          <a:prstGeom prst="rect">
+            <a:avLst/>
+          </a:prstGeom>
+        </p:spPr>
+      </p:pic>
+      <p:pic>
+        <p:nvPicPr>
+          <p:cNvPr id="9" name="Picture 8">
+            <a:extLst>
+              <a:ext uri="{FF2B5EF4-FFF2-40B4-BE49-F238E27FC236}">
+                <a16:creationId xmlns:a16="http://schemas.microsoft.com/office/drawing/2014/main" id="{17213C10-0640-4021-B21F-72065BA8538B}"/>
+              </a:ext>
+            </a:extLst>
+          </p:cNvPr>
+          <p:cNvPicPr/>
+          <p:nvPr/>
+        </p:nvPicPr>
+        <p:blipFill rotWithShape="1">
+          <a:blip r:embed="rId3"/>
+          <a:srcRect t="58279" b="6447"/>
+          <a:stretch/>
+        </p:blipFill>
+        <p:spPr>
+          <a:xfrm>
+            <a:off x="4994274" y="2286000"/>
+            <a:ext cx="3657601" cy="3190874"/>
+          </a:xfrm>
+          <a:prstGeom prst="rect">
+            <a:avLst/>
+          </a:prstGeom>
+        </p:spPr>
+      </p:pic>
+    </p:spTree>
+    <p:extLst>
+      <p:ext uri="{BB962C8B-B14F-4D97-AF65-F5344CB8AC3E}">
+        <p14:creationId xmlns:p14="http://schemas.microsoft.com/office/powerpoint/2010/main" val="1148189456"/>
+      </p:ext>
+    </p:extLst>
+  </p:cSld>
+  <p:clrMapOvr>
+    <a:masterClrMapping/>
+  </p:clrMapOvr>
+</p:sld>
+</file>
+
+<file path=ppt/slides/slide11.xml><?xml version="1.0" encoding="utf-8"?>
+<p:sld xmlns:a="http://schemas.openxmlformats.org/drawingml/2006/main" xmlns:r="http://schemas.openxmlformats.org/officeDocument/2006/relationships" xmlns:p="http://schemas.openxmlformats.org/presentationml/2006/main">
+  <p:cSld>
+    <p:spTree>
+      <p:nvGrpSpPr>
+        <p:cNvPr id="1" name=""/>
+        <p:cNvGrpSpPr/>
+        <p:nvPr/>
+      </p:nvGrpSpPr>
+      <p:grpSpPr>
+        <a:xfrm>
+          <a:off x="0" y="0"/>
+          <a:ext cx="0" cy="0"/>
+          <a:chOff x="0" y="0"/>
+          <a:chExt cx="0" cy="0"/>
+        </a:xfrm>
+      </p:grpSpPr>
+      <p:sp>
+        <p:nvSpPr>
+          <p:cNvPr id="2" name="Title 1"/>
+          <p:cNvSpPr>
+            <a:spLocks noGrp="1"/>
+          </p:cNvSpPr>
+          <p:nvPr>
+            <p:ph type="title"/>
+          </p:nvPr>
+        </p:nvSpPr>
+        <p:spPr/>
+        <p:txBody>
+          <a:bodyPr/>
+          <a:lstStyle/>
+          <a:p>
+            <a:r>
+              <a:rPr lang="en-US" dirty="0"/>
+              <a:t>Processing Complete(cont.)</a:t>
+            </a:r>
+          </a:p>
+        </p:txBody>
+      </p:sp>
+      <p:sp>
+        <p:nvSpPr>
+          <p:cNvPr id="3" name="Content Placeholder 2"/>
+          <p:cNvSpPr>
+            <a:spLocks noGrp="1"/>
+          </p:cNvSpPr>
+          <p:nvPr>
+            <p:ph idx="1"/>
+          </p:nvPr>
+        </p:nvSpPr>
+        <p:spPr/>
+        <p:txBody>
+          <a:bodyPr/>
+          <a:lstStyle/>
+          <a:p>
+            <a:r>
+              <a:rPr lang="en-US" sz="2400" dirty="0"/>
+              <a:t>The extracted and calculated information has been written into the output files.</a:t>
+            </a:r>
+          </a:p>
+          <a:p>
+            <a:pPr lvl="1"/>
+            <a:r>
+              <a:rPr lang="en-US" sz="2000" dirty="0"/>
+              <a:t>Output Data File</a:t>
+            </a:r>
+          </a:p>
+          <a:p>
+            <a:pPr marL="457200" lvl="1" indent="0">
+              <a:buNone/>
+            </a:pPr>
+            <a:endParaRPr lang="en-US" sz="2000" dirty="0"/>
+          </a:p>
+          <a:p>
+            <a:pPr marL="457200" lvl="1" indent="0">
+              <a:buNone/>
+            </a:pPr>
+            <a:r>
+              <a:rPr lang="en-US" sz="2000" dirty="0"/>
+              <a:t>                                                                                                         …</a:t>
+            </a:r>
+          </a:p>
+          <a:p>
+            <a:pPr marL="457200" lvl="1" indent="0">
+              <a:buNone/>
+            </a:pPr>
+            <a:r>
+              <a:rPr lang="en-US" sz="2000" dirty="0"/>
+              <a:t>                                                                                                         …</a:t>
+            </a:r>
+          </a:p>
+          <a:p>
+            <a:pPr marL="457200" lvl="1" indent="0">
+              <a:buNone/>
+            </a:pPr>
+            <a:r>
+              <a:rPr lang="en-US" sz="2000" dirty="0"/>
+              <a:t>                                                                                                         …</a:t>
+            </a:r>
+          </a:p>
+          <a:p>
+            <a:pPr marL="457200" lvl="1" indent="0">
+              <a:buNone/>
+            </a:pPr>
+            <a:endParaRPr lang="en-US" sz="2000" dirty="0"/>
+          </a:p>
+          <a:p>
+            <a:pPr lvl="1"/>
+            <a:endParaRPr lang="en-US" sz="2000" dirty="0"/>
+          </a:p>
+          <a:p>
+            <a:pPr lvl="1"/>
+            <a:r>
+              <a:rPr lang="en-US" sz="2000" dirty="0"/>
+              <a:t>Log File</a:t>
+            </a:r>
+          </a:p>
+        </p:txBody>
+      </p:sp>
+      <p:sp>
+        <p:nvSpPr>
+          <p:cNvPr id="4" name="Date Placeholder 3"/>
+          <p:cNvSpPr>
+            <a:spLocks noGrp="1"/>
+          </p:cNvSpPr>
+          <p:nvPr>
+            <p:ph type="dt" sz="half" idx="10"/>
+          </p:nvPr>
+        </p:nvSpPr>
+        <p:spPr/>
+        <p:txBody>
+          <a:bodyPr/>
+          <a:lstStyle/>
+          <a:p>
+            <a:pPr>
+              <a:defRPr/>
+            </a:pPr>
+            <a:fld id="{6D31C7B2-A2D2-47A3-B8FB-1F9F08ECB9D8}" type="datetime1">
+              <a:rPr lang="en-US" smtClean="0"/>
+              <a:pPr>
+                <a:defRPr/>
+              </a:pPr>
+              <a:t>8/4/2020</a:t>
+            </a:fld>
+            <a:endParaRPr lang="en-US" dirty="0"/>
+          </a:p>
+        </p:txBody>
+      </p:sp>
+      <p:sp>
+        <p:nvSpPr>
+          <p:cNvPr id="5" name="Slide Number Placeholder 4"/>
+          <p:cNvSpPr>
+            <a:spLocks noGrp="1"/>
+          </p:cNvSpPr>
+          <p:nvPr>
+            <p:ph type="sldNum" sz="quarter" idx="12"/>
+          </p:nvPr>
+        </p:nvSpPr>
+        <p:spPr/>
+        <p:txBody>
+          <a:bodyPr/>
+          <a:lstStyle/>
+          <a:p>
+            <a:pPr>
+              <a:defRPr/>
+            </a:pPr>
+            <a:fld id="{57CC77E1-4D69-4092-8C3D-CCF882968C30}" type="slidenum">
+              <a:rPr lang="en-US" smtClean="0"/>
+              <a:pPr>
+                <a:defRPr/>
+              </a:pPr>
+              <a:t>11</a:t>
             </a:fld>
             <a:endParaRPr lang="en-US" dirty="0"/>
           </a:p>
@@ -10999,8 +12022,8 @@
         </p:blipFill>
         <p:spPr>
           <a:xfrm>
-            <a:off x="1685485" y="2105688"/>
-            <a:ext cx="6467915" cy="1813719"/>
+            <a:off x="1685485" y="2105689"/>
+            <a:ext cx="6467915" cy="1628112"/>
           </a:xfrm>
           <a:prstGeom prst="rect">
             <a:avLst/>
@@ -11020,7 +12043,7 @@
 </p:sld>
 </file>
 
-<file path=ppt/slides/slide11.xml><?xml version="1.0" encoding="utf-8"?>
+<file path=ppt/slides/slide12.xml><?xml version="1.0" encoding="utf-8"?>
 <p:sld xmlns:a="http://schemas.openxmlformats.org/drawingml/2006/main" xmlns:r="http://schemas.openxmlformats.org/officeDocument/2006/relationships" xmlns:p="http://schemas.openxmlformats.org/presentationml/2006/main">
   <p:cSld>
     <p:spTree>
@@ -11111,7 +12134,7 @@
               <a:pPr>
                 <a:defRPr/>
               </a:pPr>
-              <a:t>11</a:t>
+              <a:t>12</a:t>
             </a:fld>
             <a:endParaRPr lang="en-US" dirty="0"/>
           </a:p>
@@ -11134,7 +12157,7 @@
           </p:nvPr>
         </p:nvPicPr>
         <p:blipFill>
-          <a:blip r:embed="rId2">
+          <a:blip r:embed="rId3">
             <a:extLst>
               <a:ext uri="{28A0092B-C50C-407E-A947-70E740481C1C}">
                 <a14:useLocalDpi xmlns:a14="http://schemas.microsoft.com/office/drawing/2010/main" val="0"/>
@@ -11165,7 +12188,7 @@
 </p:sld>
 </file>
 
-<file path=ppt/slides/slide12.xml><?xml version="1.0" encoding="utf-8"?>
+<file path=ppt/slides/slide13.xml><?xml version="1.0" encoding="utf-8"?>
 <p:sld xmlns:a="http://schemas.openxmlformats.org/drawingml/2006/main" xmlns:r="http://schemas.openxmlformats.org/officeDocument/2006/relationships" xmlns:p="http://schemas.openxmlformats.org/presentationml/2006/main">
   <p:cSld>
     <p:spTree>
@@ -11256,7 +12279,7 @@
               <a:pPr>
                 <a:defRPr/>
               </a:pPr>
-              <a:t>12</a:t>
+              <a:t>13</a:t>
             </a:fld>
             <a:endParaRPr lang="en-US" dirty="0"/>
           </a:p>
@@ -11310,7 +12333,7 @@
 </p:sld>
 </file>
 
-<file path=ppt/slides/slide13.xml><?xml version="1.0" encoding="utf-8"?>
+<file path=ppt/slides/slide14.xml><?xml version="1.0" encoding="utf-8"?>
 <p:sld xmlns:a="http://schemas.openxmlformats.org/drawingml/2006/main" xmlns:r="http://schemas.openxmlformats.org/officeDocument/2006/relationships" xmlns:p="http://schemas.openxmlformats.org/presentationml/2006/main">
   <p:cSld>
     <p:spTree>
@@ -11401,7 +12424,7 @@
               <a:pPr>
                 <a:defRPr/>
               </a:pPr>
-              <a:t>13</a:t>
+              <a:t>14</a:t>
             </a:fld>
             <a:endParaRPr lang="en-US" dirty="0"/>
           </a:p>
@@ -11511,7 +12534,7 @@
 </p:sld>
 </file>
 
-<file path=ppt/slides/slide14.xml><?xml version="1.0" encoding="utf-8"?>
+<file path=ppt/slides/slide15.xml><?xml version="1.0" encoding="utf-8"?>
 <p:sld xmlns:a="http://schemas.openxmlformats.org/drawingml/2006/main" xmlns:r="http://schemas.openxmlformats.org/officeDocument/2006/relationships" xmlns:p="http://schemas.openxmlformats.org/presentationml/2006/main">
   <p:cSld>
     <p:spTree>
@@ -11602,7 +12625,7 @@
               <a:pPr>
                 <a:defRPr/>
               </a:pPr>
-              <a:t>14</a:t>
+              <a:t>15</a:t>
             </a:fld>
             <a:endParaRPr lang="en-US" dirty="0"/>
           </a:p>
@@ -11656,174 +12679,6 @@
 </p:sld>
 </file>
 
-<file path=ppt/slides/slide15.xml><?xml version="1.0" encoding="utf-8"?>
-<p:sld xmlns:a="http://schemas.openxmlformats.org/drawingml/2006/main" xmlns:r="http://schemas.openxmlformats.org/officeDocument/2006/relationships" xmlns:p="http://schemas.openxmlformats.org/presentationml/2006/main">
-  <p:cSld>
-    <p:spTree>
-      <p:nvGrpSpPr>
-        <p:cNvPr id="1" name=""/>
-        <p:cNvGrpSpPr/>
-        <p:nvPr/>
-      </p:nvGrpSpPr>
-      <p:grpSpPr>
-        <a:xfrm>
-          <a:off x="0" y="0"/>
-          <a:ext cx="0" cy="0"/>
-          <a:chOff x="0" y="0"/>
-          <a:chExt cx="0" cy="0"/>
-        </a:xfrm>
-      </p:grpSpPr>
-      <p:sp>
-        <p:nvSpPr>
-          <p:cNvPr id="2" name="Title 1">
-            <a:extLst>
-              <a:ext uri="{FF2B5EF4-FFF2-40B4-BE49-F238E27FC236}">
-                <a16:creationId xmlns:a16="http://schemas.microsoft.com/office/drawing/2014/main" id="{184A4C59-0D0D-4462-B964-96DDCE46E708}"/>
-              </a:ext>
-            </a:extLst>
-          </p:cNvPr>
-          <p:cNvSpPr>
-            <a:spLocks noGrp="1"/>
-          </p:cNvSpPr>
-          <p:nvPr>
-            <p:ph type="title"/>
-          </p:nvPr>
-        </p:nvSpPr>
-        <p:spPr/>
-        <p:txBody>
-          <a:bodyPr/>
-          <a:lstStyle/>
-          <a:p>
-            <a:r>
-              <a:rPr lang="en-US" dirty="0"/>
-              <a:t>Conclusion</a:t>
-            </a:r>
-          </a:p>
-        </p:txBody>
-      </p:sp>
-      <p:sp>
-        <p:nvSpPr>
-          <p:cNvPr id="3" name="Content Placeholder 2">
-            <a:extLst>
-              <a:ext uri="{FF2B5EF4-FFF2-40B4-BE49-F238E27FC236}">
-                <a16:creationId xmlns:a16="http://schemas.microsoft.com/office/drawing/2014/main" id="{F54BE9E8-FDC3-4EF6-88E0-832D28CF9984}"/>
-              </a:ext>
-            </a:extLst>
-          </p:cNvPr>
-          <p:cNvSpPr>
-            <a:spLocks noGrp="1"/>
-          </p:cNvSpPr>
-          <p:nvPr>
-            <p:ph idx="1"/>
-          </p:nvPr>
-        </p:nvSpPr>
-        <p:spPr/>
-        <p:txBody>
-          <a:bodyPr/>
-          <a:lstStyle/>
-          <a:p>
-            <a:r>
-              <a:rPr lang="en-US" dirty="0"/>
-              <a:t>Successfully read Novatel data</a:t>
-            </a:r>
-          </a:p>
-          <a:p>
-            <a:r>
-              <a:rPr lang="en-US" dirty="0"/>
-              <a:t>Parsed Range, Time, and BestXYZ messages</a:t>
-            </a:r>
-          </a:p>
-          <a:p>
-            <a:r>
-              <a:rPr lang="en-US" dirty="0"/>
-              <a:t>Formatted the data into a human readable form</a:t>
-            </a:r>
-          </a:p>
-        </p:txBody>
-      </p:sp>
-      <p:sp>
-        <p:nvSpPr>
-          <p:cNvPr id="4" name="Date Placeholder 3">
-            <a:extLst>
-              <a:ext uri="{FF2B5EF4-FFF2-40B4-BE49-F238E27FC236}">
-                <a16:creationId xmlns:a16="http://schemas.microsoft.com/office/drawing/2014/main" id="{F21B66AE-9214-41D3-BEF0-F7CF82786284}"/>
-              </a:ext>
-            </a:extLst>
-          </p:cNvPr>
-          <p:cNvSpPr>
-            <a:spLocks noGrp="1"/>
-          </p:cNvSpPr>
-          <p:nvPr>
-            <p:ph type="dt" sz="half" idx="10"/>
-          </p:nvPr>
-        </p:nvSpPr>
-        <p:spPr/>
-        <p:txBody>
-          <a:bodyPr/>
-          <a:lstStyle/>
-          <a:p>
-            <a:pPr>
-              <a:defRPr/>
-            </a:pPr>
-            <a:fld id="{6D31C7B2-A2D2-47A3-B8FB-1F9F08ECB9D8}" type="datetime1">
-              <a:rPr lang="en-US" smtClean="0"/>
-              <a:pPr>
-                <a:defRPr/>
-              </a:pPr>
-              <a:t>8/4/2020</a:t>
-            </a:fld>
-            <a:endParaRPr lang="en-US" dirty="0"/>
-          </a:p>
-        </p:txBody>
-      </p:sp>
-      <p:sp>
-        <p:nvSpPr>
-          <p:cNvPr id="5" name="Slide Number Placeholder 4">
-            <a:extLst>
-              <a:ext uri="{FF2B5EF4-FFF2-40B4-BE49-F238E27FC236}">
-                <a16:creationId xmlns:a16="http://schemas.microsoft.com/office/drawing/2014/main" id="{D89D20B2-1638-4E0A-8D41-55D7B7F53628}"/>
-              </a:ext>
-            </a:extLst>
-          </p:cNvPr>
-          <p:cNvSpPr>
-            <a:spLocks noGrp="1"/>
-          </p:cNvSpPr>
-          <p:nvPr>
-            <p:ph type="sldNum" sz="quarter" idx="12"/>
-          </p:nvPr>
-        </p:nvSpPr>
-        <p:spPr/>
-        <p:txBody>
-          <a:bodyPr/>
-          <a:lstStyle/>
-          <a:p>
-            <a:pPr>
-              <a:defRPr/>
-            </a:pPr>
-            <a:fld id="{57CC77E1-4D69-4092-8C3D-CCF882968C30}" type="slidenum">
-              <a:rPr lang="en-US" smtClean="0"/>
-              <a:pPr>
-                <a:defRPr/>
-              </a:pPr>
-              <a:t>15</a:t>
-            </a:fld>
-            <a:endParaRPr lang="en-US" dirty="0"/>
-          </a:p>
-        </p:txBody>
-      </p:sp>
-    </p:spTree>
-    <p:extLst>
-      <p:ext uri="{BB962C8B-B14F-4D97-AF65-F5344CB8AC3E}">
-        <p14:creationId xmlns:p14="http://schemas.microsoft.com/office/powerpoint/2010/main" val="699073515"/>
-      </p:ext>
-    </p:extLst>
-  </p:cSld>
-  <p:clrMapOvr>
-    <a:masterClrMapping/>
-  </p:clrMapOvr>
-</p:sld>
-</file>
-
 <file path=ppt/slides/slide16.xml><?xml version="1.0" encoding="utf-8"?>
 <p:sld xmlns:a="http://schemas.openxmlformats.org/drawingml/2006/main" xmlns:r="http://schemas.openxmlformats.org/officeDocument/2006/relationships" xmlns:p="http://schemas.openxmlformats.org/presentationml/2006/main">
   <p:cSld>
@@ -11846,7 +12701,7 @@
           <p:cNvPr id="2" name="Title 1">
             <a:extLst>
               <a:ext uri="{FF2B5EF4-FFF2-40B4-BE49-F238E27FC236}">
-                <a16:creationId xmlns:a16="http://schemas.microsoft.com/office/drawing/2014/main" id="{0D085EB6-79F5-459C-BAC2-E493CFCCBE34}"/>
+                <a16:creationId xmlns:a16="http://schemas.microsoft.com/office/drawing/2014/main" id="{184A4C59-0D0D-4462-B964-96DDCE46E708}"/>
               </a:ext>
             </a:extLst>
           </p:cNvPr>
@@ -11862,7 +12717,10 @@
           <a:bodyPr/>
           <a:lstStyle/>
           <a:p>
-            <a:endParaRPr lang="en-US"/>
+            <a:r>
+              <a:rPr lang="en-US" dirty="0"/>
+              <a:t>Conclusion</a:t>
+            </a:r>
           </a:p>
         </p:txBody>
       </p:sp>
@@ -11871,7 +12729,7 @@
           <p:cNvPr id="3" name="Content Placeholder 2">
             <a:extLst>
               <a:ext uri="{FF2B5EF4-FFF2-40B4-BE49-F238E27FC236}">
-                <a16:creationId xmlns:a16="http://schemas.microsoft.com/office/drawing/2014/main" id="{C5810164-DC37-4FB7-8055-38287DA4BC1D}"/>
+                <a16:creationId xmlns:a16="http://schemas.microsoft.com/office/drawing/2014/main" id="{F54BE9E8-FDC3-4EF6-88E0-832D28CF9984}"/>
               </a:ext>
             </a:extLst>
           </p:cNvPr>
@@ -11887,36 +12745,28 @@
           <a:bodyPr/>
           <a:lstStyle/>
           <a:p>
-            <a:pPr marL="0" indent="0" algn="ctr">
-              <a:buNone/>
-            </a:pPr>
-            <a:endParaRPr lang="en-US" dirty="0"/>
-          </a:p>
-          <a:p>
-            <a:pPr marL="0" indent="0" algn="ctr">
-              <a:buNone/>
-            </a:pPr>
-            <a:endParaRPr lang="en-US" dirty="0"/>
-          </a:p>
-          <a:p>
-            <a:pPr marL="0" indent="0" algn="ctr">
-              <a:buNone/>
-            </a:pPr>
-            <a:endParaRPr lang="en-US" dirty="0"/>
-          </a:p>
-          <a:p>
-            <a:pPr marL="0" indent="0" algn="ctr">
-              <a:buNone/>
-            </a:pPr>
-            <a:endParaRPr lang="en-US" dirty="0"/>
-          </a:p>
-          <a:p>
-            <a:pPr marL="0" indent="0" algn="ctr">
-              <a:buNone/>
-            </a:pPr>
-            <a:r>
-              <a:rPr lang="en-US" sz="6000" dirty="0"/>
-              <a:t>Questions?</a:t>
+            <a:r>
+              <a:rPr lang="en-US" dirty="0"/>
+              <a:t>Successfully read NovAtel data</a:t>
+            </a:r>
+          </a:p>
+          <a:p>
+            <a:r>
+              <a:rPr lang="en-US" dirty="0"/>
+              <a:t>Parsed Range, Time, and BestXYZ messages</a:t>
+            </a:r>
+          </a:p>
+          <a:p>
+            <a:r>
+              <a:rPr lang="en-US" dirty="0"/>
+              <a:t>Formatted the data into a human readable form</a:t>
+            </a:r>
+          </a:p>
+          <a:p>
+            <a:pPr lvl="1"/>
+            <a:r>
+              <a:rPr lang="en-US" dirty="0"/>
+              <a:t>Can be plotted in a spreadsheet program</a:t>
             </a:r>
           </a:p>
         </p:txBody>
@@ -11926,7 +12776,7 @@
           <p:cNvPr id="4" name="Date Placeholder 3">
             <a:extLst>
               <a:ext uri="{FF2B5EF4-FFF2-40B4-BE49-F238E27FC236}">
-                <a16:creationId xmlns:a16="http://schemas.microsoft.com/office/drawing/2014/main" id="{0366426F-F6A1-4231-BAD1-24DEDD0E6F20}"/>
+                <a16:creationId xmlns:a16="http://schemas.microsoft.com/office/drawing/2014/main" id="{F21B66AE-9214-41D3-BEF0-F7CF82786284}"/>
               </a:ext>
             </a:extLst>
           </p:cNvPr>
@@ -11961,7 +12811,7 @@
           <p:cNvPr id="5" name="Slide Number Placeholder 4">
             <a:extLst>
               <a:ext uri="{FF2B5EF4-FFF2-40B4-BE49-F238E27FC236}">
-                <a16:creationId xmlns:a16="http://schemas.microsoft.com/office/drawing/2014/main" id="{8C9B533A-C61C-4F8B-ACBF-9185DBAECBAC}"/>
+                <a16:creationId xmlns:a16="http://schemas.microsoft.com/office/drawing/2014/main" id="{D89D20B2-1638-4E0A-8D41-55D7B7F53628}"/>
               </a:ext>
             </a:extLst>
           </p:cNvPr>
@@ -11986,6 +12836,186 @@
                 <a:defRPr/>
               </a:pPr>
               <a:t>16</a:t>
+            </a:fld>
+            <a:endParaRPr lang="en-US" dirty="0"/>
+          </a:p>
+        </p:txBody>
+      </p:sp>
+    </p:spTree>
+    <p:extLst>
+      <p:ext uri="{BB962C8B-B14F-4D97-AF65-F5344CB8AC3E}">
+        <p14:creationId xmlns:p14="http://schemas.microsoft.com/office/powerpoint/2010/main" val="699073515"/>
+      </p:ext>
+    </p:extLst>
+  </p:cSld>
+  <p:clrMapOvr>
+    <a:masterClrMapping/>
+  </p:clrMapOvr>
+</p:sld>
+</file>
+
+<file path=ppt/slides/slide17.xml><?xml version="1.0" encoding="utf-8"?>
+<p:sld xmlns:a="http://schemas.openxmlformats.org/drawingml/2006/main" xmlns:r="http://schemas.openxmlformats.org/officeDocument/2006/relationships" xmlns:p="http://schemas.openxmlformats.org/presentationml/2006/main">
+  <p:cSld>
+    <p:spTree>
+      <p:nvGrpSpPr>
+        <p:cNvPr id="1" name=""/>
+        <p:cNvGrpSpPr/>
+        <p:nvPr/>
+      </p:nvGrpSpPr>
+      <p:grpSpPr>
+        <a:xfrm>
+          <a:off x="0" y="0"/>
+          <a:ext cx="0" cy="0"/>
+          <a:chOff x="0" y="0"/>
+          <a:chExt cx="0" cy="0"/>
+        </a:xfrm>
+      </p:grpSpPr>
+      <p:sp>
+        <p:nvSpPr>
+          <p:cNvPr id="2" name="Title 1">
+            <a:extLst>
+              <a:ext uri="{FF2B5EF4-FFF2-40B4-BE49-F238E27FC236}">
+                <a16:creationId xmlns:a16="http://schemas.microsoft.com/office/drawing/2014/main" id="{0D085EB6-79F5-459C-BAC2-E493CFCCBE34}"/>
+              </a:ext>
+            </a:extLst>
+          </p:cNvPr>
+          <p:cNvSpPr>
+            <a:spLocks noGrp="1"/>
+          </p:cNvSpPr>
+          <p:nvPr>
+            <p:ph type="title"/>
+          </p:nvPr>
+        </p:nvSpPr>
+        <p:spPr/>
+        <p:txBody>
+          <a:bodyPr/>
+          <a:lstStyle/>
+          <a:p>
+            <a:endParaRPr lang="en-US"/>
+          </a:p>
+        </p:txBody>
+      </p:sp>
+      <p:sp>
+        <p:nvSpPr>
+          <p:cNvPr id="3" name="Content Placeholder 2">
+            <a:extLst>
+              <a:ext uri="{FF2B5EF4-FFF2-40B4-BE49-F238E27FC236}">
+                <a16:creationId xmlns:a16="http://schemas.microsoft.com/office/drawing/2014/main" id="{C5810164-DC37-4FB7-8055-38287DA4BC1D}"/>
+              </a:ext>
+            </a:extLst>
+          </p:cNvPr>
+          <p:cNvSpPr>
+            <a:spLocks noGrp="1"/>
+          </p:cNvSpPr>
+          <p:nvPr>
+            <p:ph idx="1"/>
+          </p:nvPr>
+        </p:nvSpPr>
+        <p:spPr/>
+        <p:txBody>
+          <a:bodyPr/>
+          <a:lstStyle/>
+          <a:p>
+            <a:pPr marL="0" indent="0" algn="ctr">
+              <a:buNone/>
+            </a:pPr>
+            <a:endParaRPr lang="en-US" dirty="0"/>
+          </a:p>
+          <a:p>
+            <a:pPr marL="0" indent="0" algn="ctr">
+              <a:buNone/>
+            </a:pPr>
+            <a:endParaRPr lang="en-US" dirty="0"/>
+          </a:p>
+          <a:p>
+            <a:pPr marL="0" indent="0" algn="ctr">
+              <a:buNone/>
+            </a:pPr>
+            <a:endParaRPr lang="en-US" dirty="0"/>
+          </a:p>
+          <a:p>
+            <a:pPr marL="0" indent="0" algn="ctr">
+              <a:buNone/>
+            </a:pPr>
+            <a:endParaRPr lang="en-US" dirty="0"/>
+          </a:p>
+          <a:p>
+            <a:pPr marL="0" indent="0" algn="ctr">
+              <a:buNone/>
+            </a:pPr>
+            <a:r>
+              <a:rPr lang="en-US" sz="6000" dirty="0"/>
+              <a:t>Questions?</a:t>
+            </a:r>
+          </a:p>
+        </p:txBody>
+      </p:sp>
+      <p:sp>
+        <p:nvSpPr>
+          <p:cNvPr id="4" name="Date Placeholder 3">
+            <a:extLst>
+              <a:ext uri="{FF2B5EF4-FFF2-40B4-BE49-F238E27FC236}">
+                <a16:creationId xmlns:a16="http://schemas.microsoft.com/office/drawing/2014/main" id="{0366426F-F6A1-4231-BAD1-24DEDD0E6F20}"/>
+              </a:ext>
+            </a:extLst>
+          </p:cNvPr>
+          <p:cNvSpPr>
+            <a:spLocks noGrp="1"/>
+          </p:cNvSpPr>
+          <p:nvPr>
+            <p:ph type="dt" sz="half" idx="10"/>
+          </p:nvPr>
+        </p:nvSpPr>
+        <p:spPr/>
+        <p:txBody>
+          <a:bodyPr/>
+          <a:lstStyle/>
+          <a:p>
+            <a:pPr>
+              <a:defRPr/>
+            </a:pPr>
+            <a:fld id="{6D31C7B2-A2D2-47A3-B8FB-1F9F08ECB9D8}" type="datetime1">
+              <a:rPr lang="en-US" smtClean="0"/>
+              <a:pPr>
+                <a:defRPr/>
+              </a:pPr>
+              <a:t>8/4/2020</a:t>
+            </a:fld>
+            <a:endParaRPr lang="en-US" dirty="0"/>
+          </a:p>
+        </p:txBody>
+      </p:sp>
+      <p:sp>
+        <p:nvSpPr>
+          <p:cNvPr id="5" name="Slide Number Placeholder 4">
+            <a:extLst>
+              <a:ext uri="{FF2B5EF4-FFF2-40B4-BE49-F238E27FC236}">
+                <a16:creationId xmlns:a16="http://schemas.microsoft.com/office/drawing/2014/main" id="{8C9B533A-C61C-4F8B-ACBF-9185DBAECBAC}"/>
+              </a:ext>
+            </a:extLst>
+          </p:cNvPr>
+          <p:cNvSpPr>
+            <a:spLocks noGrp="1"/>
+          </p:cNvSpPr>
+          <p:nvPr>
+            <p:ph type="sldNum" sz="quarter" idx="12"/>
+          </p:nvPr>
+        </p:nvSpPr>
+        <p:spPr/>
+        <p:txBody>
+          <a:bodyPr/>
+          <a:lstStyle/>
+          <a:p>
+            <a:pPr>
+              <a:defRPr/>
+            </a:pPr>
+            <a:fld id="{57CC77E1-4D69-4092-8C3D-CCF882968C30}" type="slidenum">
+              <a:rPr lang="en-US" smtClean="0"/>
+              <a:pPr>
+                <a:defRPr/>
+              </a:pPr>
+              <a:t>17</a:t>
             </a:fld>
             <a:endParaRPr lang="en-US" dirty="0"/>
           </a:p>
@@ -12060,14 +13090,8 @@
           <a:p>
             <a:r>
               <a:rPr lang="en-US" dirty="0"/>
-              <a:t>TSPI’s ground reference receivers</a:t>
-            </a:r>
-          </a:p>
-          <a:p>
-            <a:pPr marL="0" indent="0">
-              <a:buNone/>
-            </a:pPr>
-            <a:endParaRPr lang="en-US" dirty="0"/>
+              <a:t>Global Positioning System (GPS) receivers</a:t>
+            </a:r>
           </a:p>
           <a:p>
             <a:pPr marL="0" indent="0">
@@ -12082,9 +13106,6 @@
             </a:r>
           </a:p>
           <a:p>
-            <a:endParaRPr lang="en-US" dirty="0"/>
-          </a:p>
-          <a:p>
             <a:pPr marL="0" indent="0">
               <a:buNone/>
             </a:pPr>
@@ -12095,9 +13116,6 @@
               <a:rPr lang="en-US" dirty="0"/>
               <a:t>Positional Accuracy</a:t>
             </a:r>
-          </a:p>
-          <a:p>
-            <a:endParaRPr lang="en-US" dirty="0"/>
           </a:p>
           <a:p>
             <a:pPr marL="0" indent="0">
@@ -12247,7 +13265,7 @@
             <a:pPr lvl="1"/>
             <a:r>
               <a:rPr lang="en-US" sz="2000" dirty="0"/>
-              <a:t>Novatel Data File</a:t>
+              <a:t>NovAtel Data File</a:t>
             </a:r>
           </a:p>
           <a:p>
@@ -12255,6 +13273,22 @@
             <a:r>
               <a:rPr lang="en-US" sz="2000" dirty="0"/>
               <a:t>GPS Antenna Coordinates</a:t>
+            </a:r>
+          </a:p>
+          <a:p>
+            <a:pPr lvl="2"/>
+            <a:r>
+              <a:rPr lang="en-US" sz="1600" dirty="0"/>
+              <a:t>Earth Centered Earth Fixed</a:t>
+            </a:r>
+          </a:p>
+          <a:p>
+            <a:pPr marL="914400" lvl="2" indent="0">
+              <a:buNone/>
+            </a:pPr>
+            <a:r>
+              <a:rPr lang="en-US" sz="1600" dirty="0"/>
+              <a:t>    (ECEF) </a:t>
             </a:r>
           </a:p>
           <a:p>
@@ -12447,7 +13481,7 @@
           <a:p>
             <a:r>
               <a:rPr lang="en-US" dirty="0"/>
-              <a:t>Software Languages &amp; Tools</a:t>
+              <a:t>Development Environment</a:t>
             </a:r>
           </a:p>
         </p:txBody>
@@ -12543,7 +13577,7 @@
             <a:pPr lvl="1"/>
             <a:r>
               <a:rPr lang="en-US" sz="2000" dirty="0"/>
-              <a:t>RDITs</a:t>
+              <a:t>Requirements, Design, Implementation, and Testing Document (RDIT)</a:t>
             </a:r>
           </a:p>
           <a:p>
@@ -12652,7 +13686,13 @@
       </p:grpSpPr>
       <p:sp>
         <p:nvSpPr>
-          <p:cNvPr id="2" name="Title 1"/>
+          <p:cNvPr id="2" name="Title 1">
+            <a:extLst>
+              <a:ext uri="{FF2B5EF4-FFF2-40B4-BE49-F238E27FC236}">
+                <a16:creationId xmlns:a16="http://schemas.microsoft.com/office/drawing/2014/main" id="{D1E9181A-1C67-46F9-ABB9-9EC95BC1B878}"/>
+              </a:ext>
+            </a:extLst>
+          </p:cNvPr>
           <p:cNvSpPr>
             <a:spLocks noGrp="1"/>
           </p:cNvSpPr>
@@ -12667,86 +13707,20 @@
           <a:p>
             <a:r>
               <a:rPr lang="en-US" dirty="0"/>
-              <a:t>Specifying An Input File</a:t>
-            </a:r>
-          </a:p>
-        </p:txBody>
-      </p:sp>
-      <p:sp>
-        <p:nvSpPr>
-          <p:cNvPr id="3" name="Content Placeholder 2"/>
-          <p:cNvSpPr>
-            <a:spLocks noGrp="1"/>
-          </p:cNvSpPr>
-          <p:nvPr>
-            <p:ph idx="1"/>
-          </p:nvPr>
-        </p:nvSpPr>
-        <p:spPr/>
-        <p:txBody>
-          <a:bodyPr/>
-          <a:lstStyle/>
-          <a:p>
-            <a:r>
-              <a:rPr lang="en-US" sz="2400" dirty="0"/>
-              <a:t>File Selection</a:t>
-            </a:r>
-          </a:p>
-          <a:p>
-            <a:pPr lvl="1"/>
-            <a:r>
-              <a:rPr lang="en-US" sz="2000" dirty="0"/>
-              <a:t>File Browsing</a:t>
-            </a:r>
-          </a:p>
-          <a:p>
-            <a:pPr marL="457200" lvl="1" indent="0">
-              <a:buNone/>
-            </a:pPr>
-            <a:endParaRPr lang="en-US" sz="2000" dirty="0"/>
-          </a:p>
-          <a:p>
-            <a:pPr marL="457200" lvl="1" indent="0">
-              <a:buNone/>
-            </a:pPr>
-            <a:endParaRPr lang="en-US" sz="2000" dirty="0"/>
-          </a:p>
-          <a:p>
-            <a:pPr marL="457200" lvl="1" indent="0">
-              <a:buNone/>
-            </a:pPr>
-            <a:endParaRPr lang="en-US" sz="2000" dirty="0"/>
-          </a:p>
-          <a:p>
-            <a:pPr marL="457200" lvl="1" indent="0">
-              <a:buNone/>
-            </a:pPr>
-            <a:endParaRPr lang="en-US" sz="2000" dirty="0"/>
-          </a:p>
-          <a:p>
-            <a:pPr marL="457200" lvl="1" indent="0">
-              <a:buNone/>
-            </a:pPr>
-            <a:endParaRPr lang="en-US" sz="2000" dirty="0"/>
-          </a:p>
-          <a:p>
-            <a:pPr marL="457200" lvl="1" indent="0">
-              <a:buNone/>
-            </a:pPr>
-            <a:endParaRPr lang="en-US" sz="2000" dirty="0"/>
-          </a:p>
-          <a:p>
-            <a:pPr lvl="1"/>
-            <a:r>
-              <a:rPr lang="en-US" sz="2000" dirty="0"/>
-              <a:t>Direct Entry</a:t>
-            </a:r>
-          </a:p>
-        </p:txBody>
-      </p:sp>
-      <p:sp>
-        <p:nvSpPr>
-          <p:cNvPr id="4" name="Date Placeholder 3"/>
+              <a:t>Using the Application</a:t>
+            </a:r>
+          </a:p>
+        </p:txBody>
+      </p:sp>
+      <p:sp>
+        <p:nvSpPr>
+          <p:cNvPr id="4" name="Date Placeholder 3">
+            <a:extLst>
+              <a:ext uri="{FF2B5EF4-FFF2-40B4-BE49-F238E27FC236}">
+                <a16:creationId xmlns:a16="http://schemas.microsoft.com/office/drawing/2014/main" id="{EA1210B0-A93E-4952-85A0-5489DCED521D}"/>
+              </a:ext>
+            </a:extLst>
+          </p:cNvPr>
           <p:cNvSpPr>
             <a:spLocks noGrp="1"/>
           </p:cNvSpPr>
@@ -12775,7 +13749,13 @@
       </p:sp>
       <p:sp>
         <p:nvSpPr>
-          <p:cNvPr id="5" name="Slide Number Placeholder 4"/>
+          <p:cNvPr id="5" name="Slide Number Placeholder 4">
+            <a:extLst>
+              <a:ext uri="{FF2B5EF4-FFF2-40B4-BE49-F238E27FC236}">
+                <a16:creationId xmlns:a16="http://schemas.microsoft.com/office/drawing/2014/main" id="{A9EA61CA-3B22-4870-AE59-27B059E30AA7}"/>
+              </a:ext>
+            </a:extLst>
+          </p:cNvPr>
           <p:cNvSpPr>
             <a:spLocks noGrp="1"/>
           </p:cNvSpPr>
@@ -12797,6 +13777,218 @@
                 <a:defRPr/>
               </a:pPr>
               <a:t>5</a:t>
+            </a:fld>
+            <a:endParaRPr lang="en-US" dirty="0"/>
+          </a:p>
+        </p:txBody>
+      </p:sp>
+      <p:pic>
+        <p:nvPicPr>
+          <p:cNvPr id="6" name="Picture 5">
+            <a:extLst>
+              <a:ext uri="{FF2B5EF4-FFF2-40B4-BE49-F238E27FC236}">
+                <a16:creationId xmlns:a16="http://schemas.microsoft.com/office/drawing/2014/main" id="{5AB26397-ADA4-4BC0-BF1F-3666AC2B9AAE}"/>
+              </a:ext>
+            </a:extLst>
+          </p:cNvPr>
+          <p:cNvPicPr>
+            <a:picLocks noChangeAspect="1"/>
+          </p:cNvPicPr>
+          <p:nvPr/>
+        </p:nvPicPr>
+        <p:blipFill>
+          <a:blip r:embed="rId3"/>
+          <a:stretch>
+            <a:fillRect/>
+          </a:stretch>
+        </p:blipFill>
+        <p:spPr>
+          <a:xfrm>
+            <a:off x="3057525" y="1204119"/>
+            <a:ext cx="3028950" cy="4972050"/>
+          </a:xfrm>
+          <a:prstGeom prst="rect">
+            <a:avLst/>
+          </a:prstGeom>
+        </p:spPr>
+      </p:pic>
+    </p:spTree>
+    <p:extLst>
+      <p:ext uri="{BB962C8B-B14F-4D97-AF65-F5344CB8AC3E}">
+        <p14:creationId xmlns:p14="http://schemas.microsoft.com/office/powerpoint/2010/main" val="1000137645"/>
+      </p:ext>
+    </p:extLst>
+  </p:cSld>
+  <p:clrMapOvr>
+    <a:masterClrMapping/>
+  </p:clrMapOvr>
+</p:sld>
+</file>
+
+<file path=ppt/slides/slide6.xml><?xml version="1.0" encoding="utf-8"?>
+<p:sld xmlns:a="http://schemas.openxmlformats.org/drawingml/2006/main" xmlns:r="http://schemas.openxmlformats.org/officeDocument/2006/relationships" xmlns:p="http://schemas.openxmlformats.org/presentationml/2006/main">
+  <p:cSld>
+    <p:spTree>
+      <p:nvGrpSpPr>
+        <p:cNvPr id="1" name=""/>
+        <p:cNvGrpSpPr/>
+        <p:nvPr/>
+      </p:nvGrpSpPr>
+      <p:grpSpPr>
+        <a:xfrm>
+          <a:off x="0" y="0"/>
+          <a:ext cx="0" cy="0"/>
+          <a:chOff x="0" y="0"/>
+          <a:chExt cx="0" cy="0"/>
+        </a:xfrm>
+      </p:grpSpPr>
+      <p:sp>
+        <p:nvSpPr>
+          <p:cNvPr id="2" name="Title 1"/>
+          <p:cNvSpPr>
+            <a:spLocks noGrp="1"/>
+          </p:cNvSpPr>
+          <p:nvPr>
+            <p:ph type="title"/>
+          </p:nvPr>
+        </p:nvSpPr>
+        <p:spPr/>
+        <p:txBody>
+          <a:bodyPr/>
+          <a:lstStyle/>
+          <a:p>
+            <a:r>
+              <a:rPr lang="en-US" dirty="0"/>
+              <a:t>Specifying An Input File</a:t>
+            </a:r>
+          </a:p>
+        </p:txBody>
+      </p:sp>
+      <p:sp>
+        <p:nvSpPr>
+          <p:cNvPr id="3" name="Content Placeholder 2"/>
+          <p:cNvSpPr>
+            <a:spLocks noGrp="1"/>
+          </p:cNvSpPr>
+          <p:nvPr>
+            <p:ph idx="1"/>
+          </p:nvPr>
+        </p:nvSpPr>
+        <p:spPr/>
+        <p:txBody>
+          <a:bodyPr/>
+          <a:lstStyle/>
+          <a:p>
+            <a:r>
+              <a:rPr lang="en-US" sz="2400" dirty="0"/>
+              <a:t>File Selection</a:t>
+            </a:r>
+          </a:p>
+          <a:p>
+            <a:pPr lvl="1"/>
+            <a:r>
+              <a:rPr lang="en-US" sz="2000" dirty="0"/>
+              <a:t>File Browsing</a:t>
+            </a:r>
+          </a:p>
+          <a:p>
+            <a:pPr marL="457200" lvl="1" indent="0">
+              <a:buNone/>
+            </a:pPr>
+            <a:endParaRPr lang="en-US" sz="2000" dirty="0"/>
+          </a:p>
+          <a:p>
+            <a:pPr marL="457200" lvl="1" indent="0">
+              <a:buNone/>
+            </a:pPr>
+            <a:endParaRPr lang="en-US" sz="2000" dirty="0"/>
+          </a:p>
+          <a:p>
+            <a:pPr marL="457200" lvl="1" indent="0">
+              <a:buNone/>
+            </a:pPr>
+            <a:endParaRPr lang="en-US" sz="2000" dirty="0"/>
+          </a:p>
+          <a:p>
+            <a:pPr marL="457200" lvl="1" indent="0">
+              <a:buNone/>
+            </a:pPr>
+            <a:endParaRPr lang="en-US" sz="2000" dirty="0"/>
+          </a:p>
+          <a:p>
+            <a:pPr marL="457200" lvl="1" indent="0">
+              <a:buNone/>
+            </a:pPr>
+            <a:endParaRPr lang="en-US" sz="2000" dirty="0"/>
+          </a:p>
+          <a:p>
+            <a:pPr marL="457200" lvl="1" indent="0">
+              <a:buNone/>
+            </a:pPr>
+            <a:endParaRPr lang="en-US" sz="2000" dirty="0"/>
+          </a:p>
+          <a:p>
+            <a:pPr lvl="1"/>
+            <a:r>
+              <a:rPr lang="en-US" sz="2000" dirty="0"/>
+              <a:t>Direct Entry</a:t>
+            </a:r>
+          </a:p>
+        </p:txBody>
+      </p:sp>
+      <p:sp>
+        <p:nvSpPr>
+          <p:cNvPr id="4" name="Date Placeholder 3"/>
+          <p:cNvSpPr>
+            <a:spLocks noGrp="1"/>
+          </p:cNvSpPr>
+          <p:nvPr>
+            <p:ph type="dt" sz="half" idx="10"/>
+          </p:nvPr>
+        </p:nvSpPr>
+        <p:spPr/>
+        <p:txBody>
+          <a:bodyPr/>
+          <a:lstStyle/>
+          <a:p>
+            <a:pPr>
+              <a:defRPr/>
+            </a:pPr>
+            <a:fld id="{6D31C7B2-A2D2-47A3-B8FB-1F9F08ECB9D8}" type="datetime1">
+              <a:rPr lang="en-US" smtClean="0"/>
+              <a:pPr>
+                <a:defRPr/>
+              </a:pPr>
+              <a:t>8/4/2020</a:t>
+            </a:fld>
+            <a:endParaRPr lang="en-US" dirty="0"/>
+          </a:p>
+        </p:txBody>
+      </p:sp>
+      <p:sp>
+        <p:nvSpPr>
+          <p:cNvPr id="5" name="Slide Number Placeholder 4"/>
+          <p:cNvSpPr>
+            <a:spLocks noGrp="1"/>
+          </p:cNvSpPr>
+          <p:nvPr>
+            <p:ph type="sldNum" sz="quarter" idx="12"/>
+          </p:nvPr>
+        </p:nvSpPr>
+        <p:spPr/>
+        <p:txBody>
+          <a:bodyPr/>
+          <a:lstStyle/>
+          <a:p>
+            <a:pPr>
+              <a:defRPr/>
+            </a:pPr>
+            <a:fld id="{57CC77E1-4D69-4092-8C3D-CCF882968C30}" type="slidenum">
+              <a:rPr lang="en-US" smtClean="0"/>
+              <a:pPr>
+                <a:defRPr/>
+              </a:pPr>
+              <a:t>6</a:t>
             </a:fld>
             <a:endParaRPr lang="en-US" dirty="0"/>
           </a:p>
@@ -12815,7 +14007,7 @@
           <p:nvPr/>
         </p:nvPicPr>
         <p:blipFill rotWithShape="1">
-          <a:blip r:embed="rId2"/>
+          <a:blip r:embed="rId3"/>
           <a:srcRect b="76820"/>
           <a:stretch/>
         </p:blipFill>
@@ -12850,7 +14042,7 @@
           <p:nvPr/>
         </p:nvPicPr>
         <p:blipFill rotWithShape="1">
-          <a:blip r:embed="rId3"/>
+          <a:blip r:embed="rId4"/>
           <a:srcRect b="77011"/>
           <a:stretch/>
         </p:blipFill>
@@ -12885,7 +14077,7 @@
 </p:sld>
 </file>
 
-<file path=ppt/slides/slide6.xml><?xml version="1.0" encoding="utf-8"?>
+<file path=ppt/slides/slide7.xml><?xml version="1.0" encoding="utf-8"?>
 <p:sld xmlns:a="http://schemas.openxmlformats.org/drawingml/2006/main" xmlns:r="http://schemas.openxmlformats.org/officeDocument/2006/relationships" xmlns:p="http://schemas.openxmlformats.org/presentationml/2006/main">
   <p:cSld>
     <p:spTree>
@@ -13054,7 +14246,7 @@
               <a:pPr>
                 <a:defRPr/>
               </a:pPr>
-              <a:t>6</a:t>
+              <a:t>7</a:t>
             </a:fld>
             <a:endParaRPr lang="en-US" dirty="0"/>
           </a:p>
@@ -13073,7 +14265,7 @@
           <p:nvPr/>
         </p:nvPicPr>
         <p:blipFill rotWithShape="1">
-          <a:blip r:embed="rId2"/>
+          <a:blip r:embed="rId3"/>
           <a:srcRect t="23946" b="48276"/>
           <a:stretch/>
         </p:blipFill>
@@ -13110,7 +14302,7 @@
           <p:nvPr/>
         </p:nvPicPr>
         <p:blipFill>
-          <a:blip r:embed="rId3">
+          <a:blip r:embed="rId4">
             <a:extLst>
               <a:ext uri="{28A0092B-C50C-407E-A947-70E740481C1C}">
                 <a14:useLocalDpi xmlns:a14="http://schemas.microsoft.com/office/drawing/2010/main" val="0"/>
@@ -13144,7 +14336,7 @@
 </p:sld>
 </file>
 
-<file path=ppt/slides/slide7.xml><?xml version="1.0" encoding="utf-8"?>
+<file path=ppt/slides/slide8.xml><?xml version="1.0" encoding="utf-8"?>
 <p:sld xmlns:a="http://schemas.openxmlformats.org/drawingml/2006/main" xmlns:r="http://schemas.openxmlformats.org/officeDocument/2006/relationships" xmlns:p="http://schemas.openxmlformats.org/presentationml/2006/main">
   <p:cSld>
     <p:spTree>
@@ -13200,7 +14392,7 @@
           <a:p>
             <a:r>
               <a:rPr lang="en-US" sz="2400" dirty="0"/>
-              <a:t>The program is ready to process the input Novatel data file and GPS antenna positions.</a:t>
+              <a:t>The program is ready to process the input NovAtel data file and GPS antenna positions.</a:t>
             </a:r>
           </a:p>
         </p:txBody>
@@ -13257,7 +14449,7 @@
               <a:pPr>
                 <a:defRPr/>
               </a:pPr>
-              <a:t>7</a:t>
+              <a:t>8</a:t>
             </a:fld>
             <a:endParaRPr lang="en-US" dirty="0"/>
           </a:p>
@@ -13276,7 +14468,7 @@
           <p:nvPr/>
         </p:nvPicPr>
         <p:blipFill rotWithShape="1">
-          <a:blip r:embed="rId2"/>
+          <a:blip r:embed="rId3"/>
           <a:srcRect b="41954"/>
           <a:stretch/>
         </p:blipFill>
@@ -13311,7 +14503,7 @@
 </p:sld>
 </file>
 
-<file path=ppt/slides/slide8.xml><?xml version="1.0" encoding="utf-8"?>
+<file path=ppt/slides/slide9.xml><?xml version="1.0" encoding="utf-8"?>
 <p:sld xmlns:a="http://schemas.openxmlformats.org/drawingml/2006/main" xmlns:r="http://schemas.openxmlformats.org/officeDocument/2006/relationships" xmlns:p="http://schemas.openxmlformats.org/presentationml/2006/main">
   <p:cSld>
     <p:spTree>
@@ -13430,7 +14622,7 @@
               <a:pPr>
                 <a:defRPr/>
               </a:pPr>
-              <a:t>8</a:t>
+              <a:t>9</a:t>
             </a:fld>
             <a:endParaRPr lang="en-US" dirty="0"/>
           </a:p>
@@ -13449,7 +14641,7 @@
           <p:nvPr/>
         </p:nvPicPr>
         <p:blipFill rotWithShape="1">
-          <a:blip r:embed="rId2"/>
+          <a:blip r:embed="rId3"/>
           <a:srcRect b="40805"/>
           <a:stretch/>
         </p:blipFill>
@@ -13467,198 +14659,6 @@
     <p:extLst>
       <p:ext uri="{BB962C8B-B14F-4D97-AF65-F5344CB8AC3E}">
         <p14:creationId xmlns:p14="http://schemas.microsoft.com/office/powerpoint/2010/main" val="2564832651"/>
-      </p:ext>
-    </p:extLst>
-  </p:cSld>
-  <p:clrMapOvr>
-    <a:masterClrMapping/>
-  </p:clrMapOvr>
-</p:sld>
-</file>
-
-<file path=ppt/slides/slide9.xml><?xml version="1.0" encoding="utf-8"?>
-<p:sld xmlns:a="http://schemas.openxmlformats.org/drawingml/2006/main" xmlns:r="http://schemas.openxmlformats.org/officeDocument/2006/relationships" xmlns:p="http://schemas.openxmlformats.org/presentationml/2006/main">
-  <p:cSld>
-    <p:spTree>
-      <p:nvGrpSpPr>
-        <p:cNvPr id="1" name=""/>
-        <p:cNvGrpSpPr/>
-        <p:nvPr/>
-      </p:nvGrpSpPr>
-      <p:grpSpPr>
-        <a:xfrm>
-          <a:off x="0" y="0"/>
-          <a:ext cx="0" cy="0"/>
-          <a:chOff x="0" y="0"/>
-          <a:chExt cx="0" cy="0"/>
-        </a:xfrm>
-      </p:grpSpPr>
-      <p:sp>
-        <p:nvSpPr>
-          <p:cNvPr id="2" name="Title 1"/>
-          <p:cNvSpPr>
-            <a:spLocks noGrp="1"/>
-          </p:cNvSpPr>
-          <p:nvPr>
-            <p:ph type="title"/>
-          </p:nvPr>
-        </p:nvSpPr>
-        <p:spPr/>
-        <p:txBody>
-          <a:bodyPr/>
-          <a:lstStyle/>
-          <a:p>
-            <a:r>
-              <a:rPr lang="en-US" dirty="0"/>
-              <a:t>Processing Complete</a:t>
-            </a:r>
-          </a:p>
-        </p:txBody>
-      </p:sp>
-      <p:sp>
-        <p:nvSpPr>
-          <p:cNvPr id="3" name="Content Placeholder 2"/>
-          <p:cNvSpPr>
-            <a:spLocks noGrp="1"/>
-          </p:cNvSpPr>
-          <p:nvPr>
-            <p:ph idx="1"/>
-          </p:nvPr>
-        </p:nvSpPr>
-        <p:spPr/>
-        <p:txBody>
-          <a:bodyPr/>
-          <a:lstStyle/>
-          <a:p>
-            <a:r>
-              <a:rPr lang="en-US" sz="2400" dirty="0"/>
-              <a:t>GUI elements are re-enabled</a:t>
-            </a:r>
-          </a:p>
-          <a:p>
-            <a:r>
-              <a:rPr lang="en-US" sz="2400" dirty="0"/>
-              <a:t>Processing information is updated</a:t>
-            </a:r>
-          </a:p>
-        </p:txBody>
-      </p:sp>
-      <p:sp>
-        <p:nvSpPr>
-          <p:cNvPr id="4" name="Date Placeholder 3"/>
-          <p:cNvSpPr>
-            <a:spLocks noGrp="1"/>
-          </p:cNvSpPr>
-          <p:nvPr>
-            <p:ph type="dt" sz="half" idx="10"/>
-          </p:nvPr>
-        </p:nvSpPr>
-        <p:spPr/>
-        <p:txBody>
-          <a:bodyPr/>
-          <a:lstStyle/>
-          <a:p>
-            <a:pPr>
-              <a:defRPr/>
-            </a:pPr>
-            <a:fld id="{6D31C7B2-A2D2-47A3-B8FB-1F9F08ECB9D8}" type="datetime1">
-              <a:rPr lang="en-US" smtClean="0"/>
-              <a:pPr>
-                <a:defRPr/>
-              </a:pPr>
-              <a:t>8/4/2020</a:t>
-            </a:fld>
-            <a:endParaRPr lang="en-US" dirty="0"/>
-          </a:p>
-        </p:txBody>
-      </p:sp>
-      <p:sp>
-        <p:nvSpPr>
-          <p:cNvPr id="5" name="Slide Number Placeholder 4"/>
-          <p:cNvSpPr>
-            <a:spLocks noGrp="1"/>
-          </p:cNvSpPr>
-          <p:nvPr>
-            <p:ph type="sldNum" sz="quarter" idx="12"/>
-          </p:nvPr>
-        </p:nvSpPr>
-        <p:spPr/>
-        <p:txBody>
-          <a:bodyPr/>
-          <a:lstStyle/>
-          <a:p>
-            <a:pPr>
-              <a:defRPr/>
-            </a:pPr>
-            <a:fld id="{57CC77E1-4D69-4092-8C3D-CCF882968C30}" type="slidenum">
-              <a:rPr lang="en-US" smtClean="0"/>
-              <a:pPr>
-                <a:defRPr/>
-              </a:pPr>
-              <a:t>9</a:t>
-            </a:fld>
-            <a:endParaRPr lang="en-US" dirty="0"/>
-          </a:p>
-        </p:txBody>
-      </p:sp>
-      <p:pic>
-        <p:nvPicPr>
-          <p:cNvPr id="7" name="Picture 6">
-            <a:extLst>
-              <a:ext uri="{FF2B5EF4-FFF2-40B4-BE49-F238E27FC236}">
-                <a16:creationId xmlns:a16="http://schemas.microsoft.com/office/drawing/2014/main" id="{E0F8EACF-87B9-40ED-BC00-004B8DE45828}"/>
-              </a:ext>
-            </a:extLst>
-          </p:cNvPr>
-          <p:cNvPicPr/>
-          <p:nvPr/>
-        </p:nvPicPr>
-        <p:blipFill rotWithShape="1">
-          <a:blip r:embed="rId2"/>
-          <a:srcRect b="50000"/>
-          <a:stretch/>
-        </p:blipFill>
-        <p:spPr>
-          <a:xfrm>
-            <a:off x="538162" y="2286000"/>
-            <a:ext cx="3657601" cy="3190875"/>
-          </a:xfrm>
-          <a:prstGeom prst="rect">
-            <a:avLst/>
-          </a:prstGeom>
-        </p:spPr>
-      </p:pic>
-      <p:pic>
-        <p:nvPicPr>
-          <p:cNvPr id="9" name="Picture 8">
-            <a:extLst>
-              <a:ext uri="{FF2B5EF4-FFF2-40B4-BE49-F238E27FC236}">
-                <a16:creationId xmlns:a16="http://schemas.microsoft.com/office/drawing/2014/main" id="{17213C10-0640-4021-B21F-72065BA8538B}"/>
-              </a:ext>
-            </a:extLst>
-          </p:cNvPr>
-          <p:cNvPicPr/>
-          <p:nvPr/>
-        </p:nvPicPr>
-        <p:blipFill rotWithShape="1">
-          <a:blip r:embed="rId2"/>
-          <a:srcRect t="58279" b="6447"/>
-          <a:stretch/>
-        </p:blipFill>
-        <p:spPr>
-          <a:xfrm>
-            <a:off x="4994274" y="2286000"/>
-            <a:ext cx="3657601" cy="3190874"/>
-          </a:xfrm>
-          <a:prstGeom prst="rect">
-            <a:avLst/>
-          </a:prstGeom>
-        </p:spPr>
-      </p:pic>
-    </p:spTree>
-    <p:extLst>
-      <p:ext uri="{BB962C8B-B14F-4D97-AF65-F5344CB8AC3E}">
-        <p14:creationId xmlns:p14="http://schemas.microsoft.com/office/powerpoint/2010/main" val="1148189456"/>
       </p:ext>
     </p:extLst>
   </p:cSld>

</xml_diff>

<commit_message>
created outbrief presentation slideshow and updated slides
</commit_message>
<xml_diff>
--- a/BestXYZ_Presentation.pptx
+++ b/BestXYZ_Presentation.pptx
@@ -1557,7 +1557,7 @@
           <a:bodyPr/>
           <a:lstStyle/>
           <a:p>
-            <a:endParaRPr lang="en-US"/>
+            <a:endParaRPr lang="en-US" dirty="0"/>
           </a:p>
         </p:txBody>
       </p:sp>
@@ -1777,7 +1777,7 @@
             </a:pPr>
             <a:r>
               <a:rPr lang="en-US" dirty="0"/>
-              <a:t>	And a user entered Earth Centered Earth Fixed as E, F, and G coordinates in meters</a:t>
+              <a:t>	And a user entered Earth Centered Earth Fixed coordinates in meters. The axis for this coordinate system are labeled E, F, and G</a:t>
             </a:r>
           </a:p>
           <a:p>
@@ -1820,7 +1820,7 @@
             </a:pPr>
             <a:r>
               <a:rPr lang="en-US" dirty="0"/>
-              <a:t>The application parses messages for useful data that is then formatted into a tabular spreadsheet format. A running log file is populated with post runtime statistics such as start time and end time for the current run.</a:t>
+              <a:t>The application parses messages for useful data that is then formatted into a tabular spreadsheet. A running log file is populated with post runtime statistics such as start time and end time for the current run.</a:t>
             </a:r>
           </a:p>
           <a:p>
@@ -1932,7 +1932,7 @@
           <a:p>
             <a:r>
               <a:rPr lang="en-US" dirty="0"/>
-              <a:t>	The RDITs were used to extract a more concrete set of requirements from the User Stories.</a:t>
+              <a:t>	The Requirements, Design, Implementation, and testing documents were used to extract a more concrete set of requirements from the User Stories.</a:t>
             </a:r>
           </a:p>
           <a:p>
@@ -1950,7 +1950,7 @@
           <a:p>
             <a:r>
               <a:rPr lang="en-US" dirty="0"/>
-              <a:t>	It gives a set of steps for future users and developers to follow when testing the program for error conditions such as an incorrectly specified file path</a:t>
+              <a:t>	It gives a set of steps for future users and developers to follow when testing the program for error conditions such as an incorrectly specified file paths</a:t>
             </a:r>
           </a:p>
           <a:p>

</xml_diff>